<commit_message>
Content from Dev Days 2016 will be used for part 2
For this session the Dev Days presentation from 2016 will be used. Marking this Issue as completed.

Fixes #48
</commit_message>
<xml_diff>
--- a/Trunk/Getting Started Material/DCAF Training/1 Introduction to DCAF.pptx
+++ b/Trunk/Getting Started Material/DCAF Training/1 Introduction to DCAF.pptx
@@ -8361,7 +8361,7 @@
           <a:p>
             <a:fld id="{A8975C80-FF7F-4140-B105-CF3FA3859277}" type="datetimeFigureOut">
               <a:rPr lang="en-US" smtClean="0"/>
-              <a:t>2018-06-12</a:t>
+              <a:t>2018-06-14</a:t>
             </a:fld>
             <a:endParaRPr lang="en-US"/>
           </a:p>
@@ -10568,7 +10568,7 @@
           <a:p>
             <a:fld id="{1EAA415B-8007-489A-BDE4-6C1DCF92BB48}" type="datetimeFigureOut">
               <a:rPr lang="en-US" smtClean="0"/>
-              <a:t>2018-06-12</a:t>
+              <a:t>2018-06-14</a:t>
             </a:fld>
             <a:endParaRPr lang="en-US"/>
           </a:p>
@@ -10766,7 +10766,7 @@
           <a:p>
             <a:fld id="{1EAA415B-8007-489A-BDE4-6C1DCF92BB48}" type="datetimeFigureOut">
               <a:rPr lang="en-US" smtClean="0"/>
-              <a:t>2018-06-12</a:t>
+              <a:t>2018-06-14</a:t>
             </a:fld>
             <a:endParaRPr lang="en-US"/>
           </a:p>
@@ -10974,7 +10974,7 @@
           <a:p>
             <a:fld id="{1EAA415B-8007-489A-BDE4-6C1DCF92BB48}" type="datetimeFigureOut">
               <a:rPr lang="en-US" smtClean="0"/>
-              <a:t>2018-06-12</a:t>
+              <a:t>2018-06-14</a:t>
             </a:fld>
             <a:endParaRPr lang="en-US"/>
           </a:p>
@@ -12698,7 +12698,7 @@
           <a:p>
             <a:fld id="{1EAA415B-8007-489A-BDE4-6C1DCF92BB48}" type="datetimeFigureOut">
               <a:rPr lang="en-US" smtClean="0"/>
-              <a:t>2018-06-12</a:t>
+              <a:t>2018-06-14</a:t>
             </a:fld>
             <a:endParaRPr lang="en-US"/>
           </a:p>
@@ -12973,7 +12973,7 @@
           <a:p>
             <a:fld id="{1EAA415B-8007-489A-BDE4-6C1DCF92BB48}" type="datetimeFigureOut">
               <a:rPr lang="en-US" smtClean="0"/>
-              <a:t>2018-06-12</a:t>
+              <a:t>2018-06-14</a:t>
             </a:fld>
             <a:endParaRPr lang="en-US"/>
           </a:p>
@@ -13238,7 +13238,7 @@
           <a:p>
             <a:fld id="{1EAA415B-8007-489A-BDE4-6C1DCF92BB48}" type="datetimeFigureOut">
               <a:rPr lang="en-US" smtClean="0"/>
-              <a:t>2018-06-12</a:t>
+              <a:t>2018-06-14</a:t>
             </a:fld>
             <a:endParaRPr lang="en-US"/>
           </a:p>
@@ -13650,7 +13650,7 @@
           <a:p>
             <a:fld id="{1EAA415B-8007-489A-BDE4-6C1DCF92BB48}" type="datetimeFigureOut">
               <a:rPr lang="en-US" smtClean="0"/>
-              <a:t>2018-06-12</a:t>
+              <a:t>2018-06-14</a:t>
             </a:fld>
             <a:endParaRPr lang="en-US"/>
           </a:p>
@@ -13791,7 +13791,7 @@
           <a:p>
             <a:fld id="{1EAA415B-8007-489A-BDE4-6C1DCF92BB48}" type="datetimeFigureOut">
               <a:rPr lang="en-US" smtClean="0"/>
-              <a:t>2018-06-12</a:t>
+              <a:t>2018-06-14</a:t>
             </a:fld>
             <a:endParaRPr lang="en-US"/>
           </a:p>
@@ -13904,7 +13904,7 @@
           <a:p>
             <a:fld id="{1EAA415B-8007-489A-BDE4-6C1DCF92BB48}" type="datetimeFigureOut">
               <a:rPr lang="en-US" smtClean="0"/>
-              <a:t>2018-06-12</a:t>
+              <a:t>2018-06-14</a:t>
             </a:fld>
             <a:endParaRPr lang="en-US"/>
           </a:p>
@@ -14215,7 +14215,7 @@
           <a:p>
             <a:fld id="{1EAA415B-8007-489A-BDE4-6C1DCF92BB48}" type="datetimeFigureOut">
               <a:rPr lang="en-US" smtClean="0"/>
-              <a:t>2018-06-12</a:t>
+              <a:t>2018-06-14</a:t>
             </a:fld>
             <a:endParaRPr lang="en-US"/>
           </a:p>
@@ -14503,7 +14503,7 @@
           <a:p>
             <a:fld id="{1EAA415B-8007-489A-BDE4-6C1DCF92BB48}" type="datetimeFigureOut">
               <a:rPr lang="en-US" smtClean="0"/>
-              <a:t>2018-06-12</a:t>
+              <a:t>2018-06-14</a:t>
             </a:fld>
             <a:endParaRPr lang="en-US"/>
           </a:p>
@@ -14744,7 +14744,7 @@
           <a:p>
             <a:fld id="{1EAA415B-8007-489A-BDE4-6C1DCF92BB48}" type="datetimeFigureOut">
               <a:rPr lang="en-US" smtClean="0"/>
-              <a:t>2018-06-12</a:t>
+              <a:t>2018-06-14</a:t>
             </a:fld>
             <a:endParaRPr lang="en-US"/>
           </a:p>
@@ -15229,7 +15229,15 @@
           <a:p>
             <a:r>
               <a:rPr lang="en-US" dirty="0"/>
-              <a:t>Benjamin Celis, Mathew Pollock, Simon Perez</a:t>
+              <a:t>Benjamin </a:t>
+            </a:r>
+            <a:r>
+              <a:rPr lang="en-US" dirty="0" err="1"/>
+              <a:t>Celis</a:t>
+            </a:r>
+            <a:r>
+              <a:rPr lang="en-US" dirty="0"/>
+              <a:t>, Mathew Pollock, Simon Perez</a:t>
             </a:r>
           </a:p>
         </p:txBody>
@@ -23788,13 +23796,13 @@
   <p:clrMapOvr>
     <a:masterClrMapping/>
   </p:clrMapOvr>
-  <mc:AlternateContent xmlns:mc="http://schemas.openxmlformats.org/markup-compatibility/2006">
-    <mc:Choice xmlns:p14="http://schemas.microsoft.com/office/powerpoint/2010/main" Requires="p14">
+  <mc:AlternateContent xmlns:mc="http://schemas.openxmlformats.org/markup-compatibility/2006" xmlns:p14="http://schemas.microsoft.com/office/powerpoint/2010/main">
+    <mc:Choice Requires="p14">
       <p:transition spd="med" p14:dur="700">
         <p:fade/>
       </p:transition>
     </mc:Choice>
-    <mc:Fallback>
+    <mc:Fallback xmlns="">
       <p:transition spd="med">
         <p:fade/>
       </p:transition>

</xml_diff>

<commit_message>
First pass at ch3 DCAF Components
Did a first pass on arranging the content for the DCAF components session. Moved some things in and out of ch1 and 5
</commit_message>
<xml_diff>
--- a/Trunk/Getting Started Material/DCAF Training/1 Introduction to DCAF.pptx
+++ b/Trunk/Getting Started Material/DCAF Training/1 Introduction to DCAF.pptx
@@ -5,7 +5,7 @@
     <p:sldMasterId id="2147483648" r:id="rId1"/>
   </p:sldMasterIdLst>
   <p:notesMasterIdLst>
-    <p:notesMasterId r:id="rId29"/>
+    <p:notesMasterId r:id="rId31"/>
   </p:notesMasterIdLst>
   <p:sldIdLst>
     <p:sldId id="259" r:id="rId2"/>
@@ -17,24 +17,26 @@
     <p:sldId id="292" r:id="rId8"/>
     <p:sldId id="361" r:id="rId9"/>
     <p:sldId id="363" r:id="rId10"/>
-    <p:sldId id="318" r:id="rId11"/>
-    <p:sldId id="338" r:id="rId12"/>
-    <p:sldId id="337" r:id="rId13"/>
-    <p:sldId id="294" r:id="rId14"/>
-    <p:sldId id="265" r:id="rId15"/>
-    <p:sldId id="281" r:id="rId16"/>
-    <p:sldId id="357" r:id="rId17"/>
-    <p:sldId id="364" r:id="rId18"/>
-    <p:sldId id="341" r:id="rId19"/>
-    <p:sldId id="340" r:id="rId20"/>
-    <p:sldId id="347" r:id="rId21"/>
-    <p:sldId id="271" r:id="rId22"/>
-    <p:sldId id="362" r:id="rId23"/>
-    <p:sldId id="291" r:id="rId24"/>
-    <p:sldId id="300" r:id="rId25"/>
-    <p:sldId id="293" r:id="rId26"/>
-    <p:sldId id="278" r:id="rId27"/>
-    <p:sldId id="286" r:id="rId28"/>
+    <p:sldId id="366" r:id="rId11"/>
+    <p:sldId id="318" r:id="rId12"/>
+    <p:sldId id="338" r:id="rId13"/>
+    <p:sldId id="337" r:id="rId14"/>
+    <p:sldId id="294" r:id="rId15"/>
+    <p:sldId id="319" r:id="rId16"/>
+    <p:sldId id="281" r:id="rId17"/>
+    <p:sldId id="357" r:id="rId18"/>
+    <p:sldId id="364" r:id="rId19"/>
+    <p:sldId id="341" r:id="rId20"/>
+    <p:sldId id="340" r:id="rId21"/>
+    <p:sldId id="347" r:id="rId22"/>
+    <p:sldId id="271" r:id="rId23"/>
+    <p:sldId id="362" r:id="rId24"/>
+    <p:sldId id="291" r:id="rId25"/>
+    <p:sldId id="300" r:id="rId26"/>
+    <p:sldId id="293" r:id="rId27"/>
+    <p:sldId id="278" r:id="rId28"/>
+    <p:sldId id="365" r:id="rId29"/>
+    <p:sldId id="286" r:id="rId30"/>
   </p:sldIdLst>
   <p:sldSz cx="12192000" cy="6858000"/>
   <p:notesSz cx="6858000" cy="9144000"/>
@@ -8361,7 +8363,7 @@
           <a:p>
             <a:fld id="{A8975C80-FF7F-4140-B105-CF3FA3859277}" type="datetimeFigureOut">
               <a:rPr lang="en-US" smtClean="0"/>
-              <a:t>2018-06-14</a:t>
+              <a:t>2018-06-18</a:t>
             </a:fld>
             <a:endParaRPr lang="en-US"/>
           </a:p>
@@ -9025,7 +9027,7 @@
                 </a:solidFill>
               </a:rPr>
               <a:pPr/>
-              <a:t>15</a:t>
+              <a:t>16</a:t>
             </a:fld>
             <a:endParaRPr lang="en-US" dirty="0">
               <a:solidFill>
@@ -9181,7 +9183,7 @@
           <a:p>
             <a:fld id="{851B3976-BA5C-4172-B420-FFE6D6004C76}" type="slidenum">
               <a:rPr lang="en-US" smtClean="0"/>
-              <a:t>17</a:t>
+              <a:t>18</a:t>
             </a:fld>
             <a:endParaRPr lang="en-US" dirty="0"/>
           </a:p>
@@ -9292,7 +9294,7 @@
           <a:p>
             <a:fld id="{851B3976-BA5C-4172-B420-FFE6D6004C76}" type="slidenum">
               <a:rPr lang="en-US" smtClean="0"/>
-              <a:t>20</a:t>
+              <a:t>21</a:t>
             </a:fld>
             <a:endParaRPr lang="en-US" dirty="0"/>
           </a:p>
@@ -9376,7 +9378,7 @@
           <a:p>
             <a:fld id="{E78E71CD-9786-4621-AA97-B53C62C3E534}" type="slidenum">
               <a:rPr lang="en-US" smtClean="0"/>
-              <a:t>22</a:t>
+              <a:t>23</a:t>
             </a:fld>
             <a:endParaRPr lang="en-US"/>
           </a:p>
@@ -9468,7 +9470,7 @@
           <a:p>
             <a:fld id="{15F80049-26F3-4D89-A0B2-4E12138F92A1}" type="slidenum">
               <a:rPr lang="en-US" smtClean="0"/>
-              <a:t>23</a:t>
+              <a:t>24</a:t>
             </a:fld>
             <a:endParaRPr lang="en-US"/>
           </a:p>
@@ -9569,7 +9571,7 @@
           <a:p>
             <a:fld id="{29B424A6-7593-2C46-9CCA-8596FB18DBBE}" type="slidenum">
               <a:rPr lang="en-US" smtClean="0"/>
-              <a:t>26</a:t>
+              <a:t>27</a:t>
             </a:fld>
             <a:endParaRPr lang="en-US"/>
           </a:p>
@@ -9579,6 +9581,90 @@
     <p:extLst>
       <p:ext uri="{BB962C8B-B14F-4D97-AF65-F5344CB8AC3E}">
         <p14:creationId xmlns:p14="http://schemas.microsoft.com/office/powerpoint/2010/main" val="3113426830"/>
+      </p:ext>
+    </p:extLst>
+  </p:cSld>
+  <p:clrMapOvr>
+    <a:masterClrMapping/>
+  </p:clrMapOvr>
+</p:notes>
+</file>
+
+<file path=ppt/notesSlides/notesSlide16.xml><?xml version="1.0" encoding="utf-8"?>
+<p:notes xmlns:a="http://schemas.openxmlformats.org/drawingml/2006/main" xmlns:r="http://schemas.openxmlformats.org/officeDocument/2006/relationships" xmlns:p="http://schemas.openxmlformats.org/presentationml/2006/main">
+  <p:cSld>
+    <p:spTree>
+      <p:nvGrpSpPr>
+        <p:cNvPr id="1" name=""/>
+        <p:cNvGrpSpPr/>
+        <p:nvPr/>
+      </p:nvGrpSpPr>
+      <p:grpSpPr>
+        <a:xfrm>
+          <a:off x="0" y="0"/>
+          <a:ext cx="0" cy="0"/>
+          <a:chOff x="0" y="0"/>
+          <a:chExt cx="0" cy="0"/>
+        </a:xfrm>
+      </p:grpSpPr>
+      <p:sp>
+        <p:nvSpPr>
+          <p:cNvPr id="2" name="Slide Image Placeholder 1"/>
+          <p:cNvSpPr>
+            <a:spLocks noGrp="1" noRot="1" noChangeAspect="1"/>
+          </p:cNvSpPr>
+          <p:nvPr>
+            <p:ph type="sldImg"/>
+          </p:nvPr>
+        </p:nvSpPr>
+        <p:spPr/>
+      </p:sp>
+      <p:sp>
+        <p:nvSpPr>
+          <p:cNvPr id="3" name="Notes Placeholder 2"/>
+          <p:cNvSpPr>
+            <a:spLocks noGrp="1"/>
+          </p:cNvSpPr>
+          <p:nvPr>
+            <p:ph type="body" idx="1"/>
+          </p:nvPr>
+        </p:nvSpPr>
+        <p:spPr/>
+        <p:txBody>
+          <a:bodyPr/>
+          <a:lstStyle/>
+          <a:p>
+            <a:endParaRPr lang="en-US" dirty="0"/>
+          </a:p>
+        </p:txBody>
+      </p:sp>
+      <p:sp>
+        <p:nvSpPr>
+          <p:cNvPr id="4" name="Slide Number Placeholder 3"/>
+          <p:cNvSpPr>
+            <a:spLocks noGrp="1"/>
+          </p:cNvSpPr>
+          <p:nvPr>
+            <p:ph type="sldNum" sz="quarter" idx="10"/>
+          </p:nvPr>
+        </p:nvSpPr>
+        <p:spPr/>
+        <p:txBody>
+          <a:bodyPr/>
+          <a:lstStyle/>
+          <a:p>
+            <a:fld id="{E78E71CD-9786-4621-AA97-B53C62C3E534}" type="slidenum">
+              <a:rPr lang="en-US" smtClean="0"/>
+              <a:t>28</a:t>
+            </a:fld>
+            <a:endParaRPr lang="en-US"/>
+          </a:p>
+        </p:txBody>
+      </p:sp>
+    </p:spTree>
+    <p:extLst>
+      <p:ext uri="{BB962C8B-B14F-4D97-AF65-F5344CB8AC3E}">
+        <p14:creationId xmlns:p14="http://schemas.microsoft.com/office/powerpoint/2010/main" val="1434744202"/>
       </p:ext>
     </p:extLst>
   </p:cSld>
@@ -10030,18 +10116,18 @@
           <a:bodyPr/>
           <a:lstStyle/>
           <a:p>
-            <a:fld id="{851B3976-BA5C-4172-B420-FFE6D6004C76}" type="slidenum">
+            <a:fld id="{E78E71CD-9786-4621-AA97-B53C62C3E534}" type="slidenum">
               <a:rPr lang="en-US" smtClean="0"/>
               <a:t>10</a:t>
             </a:fld>
-            <a:endParaRPr lang="en-US" dirty="0"/>
+            <a:endParaRPr lang="en-US"/>
           </a:p>
         </p:txBody>
       </p:sp>
     </p:spTree>
     <p:extLst>
       <p:ext uri="{BB962C8B-B14F-4D97-AF65-F5344CB8AC3E}">
-        <p14:creationId xmlns:p14="http://schemas.microsoft.com/office/powerpoint/2010/main" val="3223315796"/>
+        <p14:creationId xmlns:p14="http://schemas.microsoft.com/office/powerpoint/2010/main" val="3498388985"/>
       </p:ext>
     </p:extLst>
   </p:cSld>
@@ -10125,7 +10211,7 @@
     </p:spTree>
     <p:extLst>
       <p:ext uri="{BB962C8B-B14F-4D97-AF65-F5344CB8AC3E}">
-        <p14:creationId xmlns:p14="http://schemas.microsoft.com/office/powerpoint/2010/main" val="818992878"/>
+        <p14:creationId xmlns:p14="http://schemas.microsoft.com/office/powerpoint/2010/main" val="3223315796"/>
       </p:ext>
     </p:extLst>
   </p:cSld>
@@ -10209,7 +10295,7 @@
     </p:spTree>
     <p:extLst>
       <p:ext uri="{BB962C8B-B14F-4D97-AF65-F5344CB8AC3E}">
-        <p14:creationId xmlns:p14="http://schemas.microsoft.com/office/powerpoint/2010/main" val="1343741771"/>
+        <p14:creationId xmlns:p14="http://schemas.microsoft.com/office/powerpoint/2010/main" val="818992878"/>
       </p:ext>
     </p:extLst>
   </p:cSld>
@@ -10282,18 +10368,18 @@
           <a:bodyPr/>
           <a:lstStyle/>
           <a:p>
-            <a:fld id="{E78E71CD-9786-4621-AA97-B53C62C3E534}" type="slidenum">
+            <a:fld id="{851B3976-BA5C-4172-B420-FFE6D6004C76}" type="slidenum">
               <a:rPr lang="en-US" smtClean="0"/>
               <a:t>13</a:t>
             </a:fld>
-            <a:endParaRPr lang="en-US"/>
+            <a:endParaRPr lang="en-US" dirty="0"/>
           </a:p>
         </p:txBody>
       </p:sp>
     </p:spTree>
     <p:extLst>
       <p:ext uri="{BB962C8B-B14F-4D97-AF65-F5344CB8AC3E}">
-        <p14:creationId xmlns:p14="http://schemas.microsoft.com/office/powerpoint/2010/main" val="258678966"/>
+        <p14:creationId xmlns:p14="http://schemas.microsoft.com/office/powerpoint/2010/main" val="1343741771"/>
       </p:ext>
     </p:extLst>
   </p:cSld>
@@ -10347,41 +10433,7 @@
           <a:bodyPr/>
           <a:lstStyle/>
           <a:p>
-            <a:pPr marL="0" marR="0" lvl="0" indent="0" algn="l" defTabSz="914400" rtl="0" eaLnBrk="1" fontAlgn="auto" latinLnBrk="0" hangingPunct="1">
-              <a:lnSpc>
-                <a:spcPct val="100000"/>
-              </a:lnSpc>
-              <a:spcBef>
-                <a:spcPts val="0"/>
-              </a:spcBef>
-              <a:spcAft>
-                <a:spcPts val="0"/>
-              </a:spcAft>
-              <a:buClrTx/>
-              <a:buSzTx/>
-              <a:buFontTx/>
-              <a:buNone/>
-              <a:tabLst/>
-              <a:defRPr/>
-            </a:pPr>
-            <a:r>
-              <a:rPr lang="en-US" dirty="0"/>
-              <a:t>From </a:t>
-            </a:r>
-            <a:r>
-              <a:rPr lang="en-US" dirty="0" err="1"/>
-              <a:t>DevGuide</a:t>
-            </a:r>
             <a:endParaRPr lang="en-US" dirty="0"/>
-          </a:p>
-          <a:p>
-            <a:endParaRPr lang="en-US" dirty="0"/>
-          </a:p>
-          <a:p>
-            <a:r>
-              <a:rPr lang="en-US" dirty="0"/>
-              <a:t>The modules contain Input, Process, and Output methods that are sequentially called by the engine in the main loop, as well as Init and Close methods that are called once – how this happens is discussed further in the engine section.</a:t>
-            </a:r>
           </a:p>
         </p:txBody>
       </p:sp>
@@ -10411,7 +10463,7 @@
     </p:spTree>
     <p:extLst>
       <p:ext uri="{BB962C8B-B14F-4D97-AF65-F5344CB8AC3E}">
-        <p14:creationId xmlns:p14="http://schemas.microsoft.com/office/powerpoint/2010/main" val="2005954355"/>
+        <p14:creationId xmlns:p14="http://schemas.microsoft.com/office/powerpoint/2010/main" val="258678966"/>
       </p:ext>
     </p:extLst>
   </p:cSld>
@@ -10568,7 +10620,7 @@
           <a:p>
             <a:fld id="{1EAA415B-8007-489A-BDE4-6C1DCF92BB48}" type="datetimeFigureOut">
               <a:rPr lang="en-US" smtClean="0"/>
-              <a:t>2018-06-14</a:t>
+              <a:t>2018-06-18</a:t>
             </a:fld>
             <a:endParaRPr lang="en-US"/>
           </a:p>
@@ -10766,7 +10818,7 @@
           <a:p>
             <a:fld id="{1EAA415B-8007-489A-BDE4-6C1DCF92BB48}" type="datetimeFigureOut">
               <a:rPr lang="en-US" smtClean="0"/>
-              <a:t>2018-06-14</a:t>
+              <a:t>2018-06-18</a:t>
             </a:fld>
             <a:endParaRPr lang="en-US"/>
           </a:p>
@@ -10974,7 +11026,7 @@
           <a:p>
             <a:fld id="{1EAA415B-8007-489A-BDE4-6C1DCF92BB48}" type="datetimeFigureOut">
               <a:rPr lang="en-US" smtClean="0"/>
-              <a:t>2018-06-14</a:t>
+              <a:t>2018-06-18</a:t>
             </a:fld>
             <a:endParaRPr lang="en-US"/>
           </a:p>
@@ -12698,7 +12750,7 @@
           <a:p>
             <a:fld id="{1EAA415B-8007-489A-BDE4-6C1DCF92BB48}" type="datetimeFigureOut">
               <a:rPr lang="en-US" smtClean="0"/>
-              <a:t>2018-06-14</a:t>
+              <a:t>2018-06-18</a:t>
             </a:fld>
             <a:endParaRPr lang="en-US"/>
           </a:p>
@@ -12973,7 +13025,7 @@
           <a:p>
             <a:fld id="{1EAA415B-8007-489A-BDE4-6C1DCF92BB48}" type="datetimeFigureOut">
               <a:rPr lang="en-US" smtClean="0"/>
-              <a:t>2018-06-14</a:t>
+              <a:t>2018-06-18</a:t>
             </a:fld>
             <a:endParaRPr lang="en-US"/>
           </a:p>
@@ -13238,7 +13290,7 @@
           <a:p>
             <a:fld id="{1EAA415B-8007-489A-BDE4-6C1DCF92BB48}" type="datetimeFigureOut">
               <a:rPr lang="en-US" smtClean="0"/>
-              <a:t>2018-06-14</a:t>
+              <a:t>2018-06-18</a:t>
             </a:fld>
             <a:endParaRPr lang="en-US"/>
           </a:p>
@@ -13650,7 +13702,7 @@
           <a:p>
             <a:fld id="{1EAA415B-8007-489A-BDE4-6C1DCF92BB48}" type="datetimeFigureOut">
               <a:rPr lang="en-US" smtClean="0"/>
-              <a:t>2018-06-14</a:t>
+              <a:t>2018-06-18</a:t>
             </a:fld>
             <a:endParaRPr lang="en-US"/>
           </a:p>
@@ -13791,7 +13843,7 @@
           <a:p>
             <a:fld id="{1EAA415B-8007-489A-BDE4-6C1DCF92BB48}" type="datetimeFigureOut">
               <a:rPr lang="en-US" smtClean="0"/>
-              <a:t>2018-06-14</a:t>
+              <a:t>2018-06-18</a:t>
             </a:fld>
             <a:endParaRPr lang="en-US"/>
           </a:p>
@@ -13904,7 +13956,7 @@
           <a:p>
             <a:fld id="{1EAA415B-8007-489A-BDE4-6C1DCF92BB48}" type="datetimeFigureOut">
               <a:rPr lang="en-US" smtClean="0"/>
-              <a:t>2018-06-14</a:t>
+              <a:t>2018-06-18</a:t>
             </a:fld>
             <a:endParaRPr lang="en-US"/>
           </a:p>
@@ -14215,7 +14267,7 @@
           <a:p>
             <a:fld id="{1EAA415B-8007-489A-BDE4-6C1DCF92BB48}" type="datetimeFigureOut">
               <a:rPr lang="en-US" smtClean="0"/>
-              <a:t>2018-06-14</a:t>
+              <a:t>2018-06-18</a:t>
             </a:fld>
             <a:endParaRPr lang="en-US"/>
           </a:p>
@@ -14503,7 +14555,7 @@
           <a:p>
             <a:fld id="{1EAA415B-8007-489A-BDE4-6C1DCF92BB48}" type="datetimeFigureOut">
               <a:rPr lang="en-US" smtClean="0"/>
-              <a:t>2018-06-14</a:t>
+              <a:t>2018-06-18</a:t>
             </a:fld>
             <a:endParaRPr lang="en-US"/>
           </a:p>
@@ -14744,7 +14796,7 @@
           <a:p>
             <a:fld id="{1EAA415B-8007-489A-BDE4-6C1DCF92BB48}" type="datetimeFigureOut">
               <a:rPr lang="en-US" smtClean="0"/>
-              <a:t>2018-06-14</a:t>
+              <a:t>2018-06-18</a:t>
             </a:fld>
             <a:endParaRPr lang="en-US"/>
           </a:p>
@@ -15293,6 +15345,122 @@
       </p:grpSpPr>
       <p:sp>
         <p:nvSpPr>
+          <p:cNvPr id="7" name="Rounded Rectangle 6"/>
+          <p:cNvSpPr/>
+          <p:nvPr/>
+        </p:nvSpPr>
+        <p:spPr>
+          <a:xfrm>
+            <a:off x="8226251" y="533006"/>
+            <a:ext cx="1405593" cy="1157682"/>
+          </a:xfrm>
+          <a:prstGeom prst="roundRect">
+            <a:avLst/>
+          </a:prstGeom>
+          <a:solidFill>
+            <a:schemeClr val="bg1">
+              <a:lumMod val="75000"/>
+            </a:schemeClr>
+          </a:solidFill>
+          <a:ln w="28575">
+            <a:solidFill>
+              <a:schemeClr val="tx1"/>
+            </a:solidFill>
+          </a:ln>
+          <a:effectLst>
+            <a:outerShdw blurRad="50800" dist="38100" dir="2700000" algn="tl" rotWithShape="0">
+              <a:prstClr val="black">
+                <a:alpha val="40000"/>
+              </a:prstClr>
+            </a:outerShdw>
+          </a:effectLst>
+        </p:spPr>
+        <p:style>
+          <a:lnRef idx="1">
+            <a:schemeClr val="accent1"/>
+          </a:lnRef>
+          <a:fillRef idx="3">
+            <a:schemeClr val="accent1"/>
+          </a:fillRef>
+          <a:effectRef idx="2">
+            <a:schemeClr val="accent1"/>
+          </a:effectRef>
+          <a:fontRef idx="minor">
+            <a:schemeClr val="lt1"/>
+          </a:fontRef>
+        </p:style>
+        <p:txBody>
+          <a:bodyPr rtlCol="0" anchor="t" anchorCtr="0"/>
+          <a:lstStyle/>
+          <a:p>
+            <a:endParaRPr lang="en-US" b="1" dirty="0">
+              <a:solidFill>
+                <a:schemeClr val="tx1"/>
+              </a:solidFill>
+            </a:endParaRPr>
+          </a:p>
+        </p:txBody>
+      </p:sp>
+      <p:sp>
+        <p:nvSpPr>
+          <p:cNvPr id="8" name="Rounded Rectangle 7"/>
+          <p:cNvSpPr/>
+          <p:nvPr/>
+        </p:nvSpPr>
+        <p:spPr>
+          <a:xfrm>
+            <a:off x="9948207" y="533006"/>
+            <a:ext cx="1405593" cy="1157682"/>
+          </a:xfrm>
+          <a:prstGeom prst="roundRect">
+            <a:avLst/>
+          </a:prstGeom>
+          <a:solidFill>
+            <a:schemeClr val="bg1">
+              <a:lumMod val="85000"/>
+            </a:schemeClr>
+          </a:solidFill>
+          <a:ln w="28575">
+            <a:solidFill>
+              <a:schemeClr val="tx1"/>
+            </a:solidFill>
+          </a:ln>
+          <a:effectLst>
+            <a:outerShdw blurRad="50800" dist="38100" dir="2700000" algn="tl" rotWithShape="0">
+              <a:prstClr val="black">
+                <a:alpha val="40000"/>
+              </a:prstClr>
+            </a:outerShdw>
+          </a:effectLst>
+        </p:spPr>
+        <p:style>
+          <a:lnRef idx="1">
+            <a:schemeClr val="accent1"/>
+          </a:lnRef>
+          <a:fillRef idx="3">
+            <a:schemeClr val="accent1"/>
+          </a:fillRef>
+          <a:effectRef idx="2">
+            <a:schemeClr val="accent1"/>
+          </a:effectRef>
+          <a:fontRef idx="minor">
+            <a:schemeClr val="lt1"/>
+          </a:fontRef>
+        </p:style>
+        <p:txBody>
+          <a:bodyPr rtlCol="0" anchor="t" anchorCtr="0"/>
+          <a:lstStyle/>
+          <a:p>
+            <a:endParaRPr lang="en-US" b="1" dirty="0">
+              <a:solidFill>
+                <a:schemeClr val="tx1"/>
+              </a:solidFill>
+            </a:endParaRPr>
+          </a:p>
+        </p:txBody>
+      </p:sp>
+      <p:sp>
+        <p:nvSpPr>
           <p:cNvPr id="2" name="Title 1"/>
           <p:cNvSpPr>
             <a:spLocks noGrp="1"/>
@@ -15303,45 +15471,22 @@
         </p:nvSpPr>
         <p:spPr/>
         <p:txBody>
-          <a:bodyPr>
-            <a:normAutofit/>
-          </a:bodyPr>
+          <a:bodyPr/>
           <a:lstStyle/>
           <a:p>
             <a:r>
               <a:rPr lang="en-US" dirty="0"/>
-              <a:t>Module Components</a:t>
+              <a:t>DCAF Components</a:t>
             </a:r>
           </a:p>
         </p:txBody>
       </p:sp>
-      <p:graphicFrame>
-        <p:nvGraphicFramePr>
-          <p:cNvPr id="5" name="Content Placeholder 4"/>
-          <p:cNvGraphicFramePr>
-            <a:graphicFrameLocks noGrp="1"/>
-          </p:cNvGraphicFramePr>
-          <p:nvPr>
-            <p:ph sz="half" idx="1"/>
-            <p:extLst/>
-          </p:nvPr>
-        </p:nvGraphicFramePr>
-        <p:xfrm>
-          <a:off x="838200" y="1825625"/>
-          <a:ext cx="5181600" cy="4351338"/>
-        </p:xfrm>
-        <a:graphic>
-          <a:graphicData uri="http://schemas.openxmlformats.org/drawingml/2006/diagram">
-            <dgm:relIds xmlns:dgm="http://schemas.openxmlformats.org/drawingml/2006/diagram" xmlns:r="http://schemas.openxmlformats.org/officeDocument/2006/relationships" r:dm="rId3" r:lo="rId4" r:qs="rId5" r:cs="rId6"/>
-          </a:graphicData>
-        </a:graphic>
-      </p:graphicFrame>
       <p:sp>
         <p:nvSpPr>
           <p:cNvPr id="3" name="Content Placeholder 2">
             <a:extLst>
               <a:ext uri="{FF2B5EF4-FFF2-40B4-BE49-F238E27FC236}">
-                <a16:creationId xmlns:a16="http://schemas.microsoft.com/office/drawing/2014/main" id="{9E2C23AD-8821-4E73-89B1-ABC9E255F3E3}"/>
+                <a16:creationId xmlns:a16="http://schemas.microsoft.com/office/drawing/2014/main" id="{4D3EF6CF-9A23-437F-AD42-D136B975E032}"/>
               </a:ext>
             </a:extLst>
           </p:cNvPr>
@@ -15349,75 +15494,312 @@
             <a:spLocks noGrp="1"/>
           </p:cNvSpPr>
           <p:nvPr>
-            <p:ph sz="half" idx="2"/>
+            <p:ph idx="1"/>
           </p:nvPr>
         </p:nvSpPr>
         <p:spPr/>
         <p:txBody>
-          <a:bodyPr>
-            <a:normAutofit fontScale="85000" lnSpcReduction="20000"/>
-          </a:bodyPr>
+          <a:bodyPr/>
           <a:lstStyle/>
           <a:p>
             <a:r>
+              <a:rPr lang="en-US" b="1" dirty="0"/>
+              <a:t>Engine</a:t>
+            </a:r>
+            <a:r>
               <a:rPr lang="en-US" dirty="0"/>
-              <a:t>Configuration</a:t>
-            </a:r>
-          </a:p>
-          <a:p>
-            <a:pPr marL="380990" indent="-380990"/>
+              <a:t>: State machine that executes </a:t>
+            </a:r>
+            <a:r>
+              <a:rPr lang="en-US" i="1" dirty="0"/>
+              <a:t>Modules</a:t>
+            </a:r>
             <a:r>
               <a:rPr lang="en-US" dirty="0"/>
-              <a:t>Created on PC, passed to runtime system</a:t>
-            </a:r>
-          </a:p>
-          <a:p>
-            <a:pPr marL="380990" indent="-380990"/>
+              <a:t> as defined in the </a:t>
+            </a:r>
+            <a:r>
+              <a:rPr lang="en-US" i="1" dirty="0"/>
+              <a:t>Configuration Editor</a:t>
+            </a:r>
             <a:r>
               <a:rPr lang="en-US" dirty="0"/>
-              <a:t>Provides data access and serialization/deserialization methods</a:t>
-            </a:r>
-          </a:p>
-          <a:p>
-            <a:pPr marL="380990" indent="-380990"/>
+              <a:t> and provides a namespace for </a:t>
+            </a:r>
+            <a:r>
+              <a:rPr lang="en-US" i="1" dirty="0"/>
+              <a:t>Tags</a:t>
+            </a:r>
             <a:r>
               <a:rPr lang="en-US" dirty="0"/>
-              <a:t>Data storage only, no editor or runtime logic</a:t>
-            </a:r>
-          </a:p>
-          <a:p>
-            <a:pPr marL="380990" indent="-380990"/>
+              <a:t>. The Engine also passes data between its </a:t>
+            </a:r>
+            <a:r>
+              <a:rPr lang="en-US" i="1" dirty="0"/>
+              <a:t>Modules</a:t>
+            </a:r>
+            <a:r>
+              <a:rPr lang="en-US" dirty="0"/>
+              <a:t> according to its </a:t>
+            </a:r>
+            <a:r>
+              <a:rPr lang="en-US" i="1" dirty="0"/>
+              <a:t>Mappings</a:t>
+            </a:r>
+            <a:r>
+              <a:rPr lang="en-US" dirty="0"/>
+              <a:t>.</a:t>
+            </a:r>
+          </a:p>
+          <a:p>
+            <a:r>
+              <a:rPr lang="en-US" b="1" dirty="0"/>
+              <a:t>Module</a:t>
+            </a:r>
+            <a:r>
+              <a:rPr lang="en-US" dirty="0"/>
+              <a:t>: A collection of code of varying functionality that executes within an </a:t>
+            </a:r>
+            <a:r>
+              <a:rPr lang="en-US" i="1" dirty="0"/>
+              <a:t>Engine</a:t>
+            </a:r>
+            <a:r>
+              <a:rPr lang="en-US" dirty="0"/>
+              <a:t> and that can interact with the </a:t>
+            </a:r>
+            <a:r>
+              <a:rPr lang="en-US" i="1" dirty="0"/>
+              <a:t>Tags</a:t>
+            </a:r>
+            <a:r>
+              <a:rPr lang="en-US" dirty="0"/>
+              <a:t> of that </a:t>
+            </a:r>
+            <a:r>
+              <a:rPr lang="en-US" i="1" dirty="0"/>
+              <a:t>Engine</a:t>
+            </a:r>
+            <a:r>
+              <a:rPr lang="en-US" dirty="0"/>
+              <a:t>. Some standard </a:t>
+            </a:r>
+            <a:r>
+              <a:rPr lang="en-US" i="1" dirty="0"/>
+              <a:t>Modules</a:t>
+            </a:r>
+            <a:r>
+              <a:rPr lang="en-US" dirty="0"/>
+              <a:t> are installed with DCAF, but users can also create their own.</a:t>
+            </a:r>
+          </a:p>
+          <a:p>
+            <a:r>
+              <a:rPr lang="en-US" b="1" dirty="0"/>
+              <a:t>Configuration Editor</a:t>
+            </a:r>
+            <a:r>
+              <a:rPr lang="en-US" dirty="0"/>
+              <a:t>: A LabVIEW program used to visually define the functionality of each </a:t>
+            </a:r>
+            <a:r>
+              <a:rPr lang="en-US" i="1" dirty="0"/>
+              <a:t>Engine</a:t>
+            </a:r>
+            <a:r>
+              <a:rPr lang="en-US" dirty="0"/>
+              <a:t> and </a:t>
+            </a:r>
+            <a:r>
+              <a:rPr lang="en-US" i="1" dirty="0"/>
+              <a:t>Module</a:t>
+            </a:r>
+            <a:r>
+              <a:rPr lang="en-US" dirty="0"/>
+              <a:t> in DCAF.</a:t>
+            </a:r>
+          </a:p>
+          <a:p>
             <a:endParaRPr lang="en-US" dirty="0"/>
           </a:p>
-          <a:p>
+        </p:txBody>
+      </p:sp>
+      <p:sp>
+        <p:nvSpPr>
+          <p:cNvPr id="4" name="Rounded Rectangle 3"/>
+          <p:cNvSpPr/>
+          <p:nvPr/>
+        </p:nvSpPr>
+        <p:spPr>
+          <a:xfrm>
+            <a:off x="10097589" y="754072"/>
+            <a:ext cx="1090877" cy="222063"/>
+          </a:xfrm>
+          <a:prstGeom prst="roundRect">
+            <a:avLst/>
+          </a:prstGeom>
+          <a:solidFill>
+            <a:schemeClr val="accent3">
+              <a:lumMod val="75000"/>
+            </a:schemeClr>
+          </a:solidFill>
+          <a:ln w="28575">
+            <a:solidFill>
+              <a:schemeClr val="tx1"/>
+            </a:solidFill>
+          </a:ln>
+          <a:effectLst>
+            <a:outerShdw blurRad="50800" dist="38100" dir="2700000" algn="tl" rotWithShape="0">
+              <a:prstClr val="black">
+                <a:alpha val="40000"/>
+              </a:prstClr>
+            </a:outerShdw>
+          </a:effectLst>
+        </p:spPr>
+        <p:style>
+          <a:lnRef idx="1">
+            <a:schemeClr val="accent1"/>
+          </a:lnRef>
+          <a:fillRef idx="3">
+            <a:schemeClr val="accent1"/>
+          </a:fillRef>
+          <a:effectRef idx="2">
+            <a:schemeClr val="accent1"/>
+          </a:effectRef>
+          <a:fontRef idx="minor">
+            <a:schemeClr val="lt1"/>
+          </a:fontRef>
+        </p:style>
+        <p:txBody>
+          <a:bodyPr rtlCol="0" anchor="ctr"/>
+          <a:lstStyle/>
+          <a:p>
+            <a:pPr algn="ctr"/>
             <a:r>
               <a:rPr lang="en-US" dirty="0"/>
-              <a:t>Runtime Node</a:t>
-            </a:r>
-          </a:p>
-          <a:p>
-            <a:pPr marL="380990" indent="-380990"/>
+              <a:t>Runtime</a:t>
+            </a:r>
+          </a:p>
+        </p:txBody>
+      </p:sp>
+      <p:sp>
+        <p:nvSpPr>
+          <p:cNvPr id="6" name="Rounded Rectangle 5"/>
+          <p:cNvSpPr/>
+          <p:nvPr/>
+        </p:nvSpPr>
+        <p:spPr>
+          <a:xfrm>
+            <a:off x="8409772" y="746224"/>
+            <a:ext cx="1038549" cy="229911"/>
+          </a:xfrm>
+          <a:prstGeom prst="roundRect">
+            <a:avLst/>
+          </a:prstGeom>
+          <a:solidFill>
+            <a:schemeClr val="accent1">
+              <a:lumMod val="75000"/>
+            </a:schemeClr>
+          </a:solidFill>
+          <a:ln w="28575">
+            <a:solidFill>
+              <a:schemeClr val="tx1"/>
+            </a:solidFill>
+          </a:ln>
+          <a:effectLst>
+            <a:outerShdw blurRad="50800" dist="38100" dir="2700000" algn="tl" rotWithShape="0">
+              <a:prstClr val="black">
+                <a:alpha val="40000"/>
+              </a:prstClr>
+            </a:outerShdw>
+          </a:effectLst>
+        </p:spPr>
+        <p:style>
+          <a:lnRef idx="1">
+            <a:schemeClr val="accent1"/>
+          </a:lnRef>
+          <a:fillRef idx="3">
+            <a:schemeClr val="accent1"/>
+          </a:fillRef>
+          <a:effectRef idx="2">
+            <a:schemeClr val="accent1"/>
+          </a:effectRef>
+          <a:fontRef idx="minor">
+            <a:schemeClr val="lt1"/>
+          </a:fontRef>
+        </p:style>
+        <p:txBody>
+          <a:bodyPr rtlCol="0" anchor="ctr"/>
+          <a:lstStyle/>
+          <a:p>
+            <a:pPr algn="ctr"/>
             <a:r>
               <a:rPr lang="en-US" dirty="0"/>
-              <a:t>Initializes runtime based on configuration</a:t>
-            </a:r>
-          </a:p>
-          <a:p>
-            <a:pPr marL="380990" indent="-380990"/>
+              <a:t>Editor</a:t>
+            </a:r>
+          </a:p>
+        </p:txBody>
+      </p:sp>
+      <p:sp>
+        <p:nvSpPr>
+          <p:cNvPr id="5" name="Rounded Rectangle 4"/>
+          <p:cNvSpPr/>
+          <p:nvPr/>
+        </p:nvSpPr>
+        <p:spPr>
+          <a:xfrm>
+            <a:off x="8409772" y="1222045"/>
+            <a:ext cx="2760507" cy="229911"/>
+          </a:xfrm>
+          <a:prstGeom prst="roundRect">
+            <a:avLst/>
+          </a:prstGeom>
+          <a:solidFill>
+            <a:srgbClr val="C00000"/>
+          </a:solidFill>
+          <a:ln w="28575">
+            <a:solidFill>
+              <a:schemeClr val="tx1"/>
+            </a:solidFill>
+          </a:ln>
+          <a:effectLst>
+            <a:outerShdw blurRad="50800" dist="38100" dir="2700000" algn="tl" rotWithShape="0">
+              <a:prstClr val="black">
+                <a:alpha val="40000"/>
+              </a:prstClr>
+            </a:outerShdw>
+          </a:effectLst>
+        </p:spPr>
+        <p:style>
+          <a:lnRef idx="1">
+            <a:schemeClr val="accent1"/>
+          </a:lnRef>
+          <a:fillRef idx="3">
+            <a:schemeClr val="accent1"/>
+          </a:fillRef>
+          <a:effectRef idx="2">
+            <a:schemeClr val="accent1"/>
+          </a:effectRef>
+          <a:fontRef idx="minor">
+            <a:schemeClr val="lt1"/>
+          </a:fontRef>
+        </p:style>
+        <p:txBody>
+          <a:bodyPr rtlCol="0" anchor="ctr"/>
+          <a:lstStyle/>
+          <a:p>
+            <a:pPr algn="ctr"/>
             <a:r>
               <a:rPr lang="en-US" dirty="0"/>
-              <a:t>Provides execution logic</a:t>
-            </a:r>
-          </a:p>
-          <a:p>
-            <a:endParaRPr lang="en-US" dirty="0"/>
+              <a:t>Modules</a:t>
+            </a:r>
           </a:p>
         </p:txBody>
       </p:sp>
     </p:spTree>
     <p:extLst>
       <p:ext uri="{BB962C8B-B14F-4D97-AF65-F5344CB8AC3E}">
-        <p14:creationId xmlns:p14="http://schemas.microsoft.com/office/powerpoint/2010/main" val="1670580510"/>
+        <p14:creationId xmlns:p14="http://schemas.microsoft.com/office/powerpoint/2010/main" val="3295346443"/>
       </p:ext>
     </p:extLst>
   </p:cSld>
@@ -15494,6 +15876,159 @@
           <p:cNvPr id="3" name="Content Placeholder 2">
             <a:extLst>
               <a:ext uri="{FF2B5EF4-FFF2-40B4-BE49-F238E27FC236}">
+                <a16:creationId xmlns:a16="http://schemas.microsoft.com/office/drawing/2014/main" id="{9E2C23AD-8821-4E73-89B1-ABC9E255F3E3}"/>
+              </a:ext>
+            </a:extLst>
+          </p:cNvPr>
+          <p:cNvSpPr>
+            <a:spLocks noGrp="1"/>
+          </p:cNvSpPr>
+          <p:nvPr>
+            <p:ph sz="half" idx="2"/>
+          </p:nvPr>
+        </p:nvSpPr>
+        <p:spPr/>
+        <p:txBody>
+          <a:bodyPr>
+            <a:normAutofit fontScale="85000" lnSpcReduction="20000"/>
+          </a:bodyPr>
+          <a:lstStyle/>
+          <a:p>
+            <a:r>
+              <a:rPr lang="en-US" dirty="0"/>
+              <a:t>Configuration</a:t>
+            </a:r>
+          </a:p>
+          <a:p>
+            <a:pPr marL="380990" indent="-380990"/>
+            <a:r>
+              <a:rPr lang="en-US" dirty="0"/>
+              <a:t>Created on PC, passed to runtime system</a:t>
+            </a:r>
+          </a:p>
+          <a:p>
+            <a:pPr marL="380990" indent="-380990"/>
+            <a:r>
+              <a:rPr lang="en-US" dirty="0"/>
+              <a:t>Provides data access and serialization/deserialization methods</a:t>
+            </a:r>
+          </a:p>
+          <a:p>
+            <a:pPr marL="380990" indent="-380990"/>
+            <a:r>
+              <a:rPr lang="en-US" dirty="0"/>
+              <a:t>Data storage only, no editor or runtime logic</a:t>
+            </a:r>
+          </a:p>
+          <a:p>
+            <a:pPr marL="380990" indent="-380990"/>
+            <a:endParaRPr lang="en-US" dirty="0"/>
+          </a:p>
+          <a:p>
+            <a:r>
+              <a:rPr lang="en-US" dirty="0"/>
+              <a:t>Runtime Node</a:t>
+            </a:r>
+          </a:p>
+          <a:p>
+            <a:pPr marL="380990" indent="-380990"/>
+            <a:r>
+              <a:rPr lang="en-US" dirty="0"/>
+              <a:t>Initializes runtime based on configuration</a:t>
+            </a:r>
+          </a:p>
+          <a:p>
+            <a:pPr marL="380990" indent="-380990"/>
+            <a:r>
+              <a:rPr lang="en-US" dirty="0"/>
+              <a:t>Provides execution logic</a:t>
+            </a:r>
+          </a:p>
+          <a:p>
+            <a:endParaRPr lang="en-US" dirty="0"/>
+          </a:p>
+        </p:txBody>
+      </p:sp>
+    </p:spTree>
+    <p:extLst>
+      <p:ext uri="{BB962C8B-B14F-4D97-AF65-F5344CB8AC3E}">
+        <p14:creationId xmlns:p14="http://schemas.microsoft.com/office/powerpoint/2010/main" val="1670580510"/>
+      </p:ext>
+    </p:extLst>
+  </p:cSld>
+  <p:clrMapOvr>
+    <a:masterClrMapping/>
+  </p:clrMapOvr>
+</p:sld>
+</file>
+
+<file path=ppt/slides/slide12.xml><?xml version="1.0" encoding="utf-8"?>
+<p:sld xmlns:a="http://schemas.openxmlformats.org/drawingml/2006/main" xmlns:r="http://schemas.openxmlformats.org/officeDocument/2006/relationships" xmlns:p="http://schemas.openxmlformats.org/presentationml/2006/main">
+  <p:cSld>
+    <p:spTree>
+      <p:nvGrpSpPr>
+        <p:cNvPr id="1" name=""/>
+        <p:cNvGrpSpPr/>
+        <p:nvPr/>
+      </p:nvGrpSpPr>
+      <p:grpSpPr>
+        <a:xfrm>
+          <a:off x="0" y="0"/>
+          <a:ext cx="0" cy="0"/>
+          <a:chOff x="0" y="0"/>
+          <a:chExt cx="0" cy="0"/>
+        </a:xfrm>
+      </p:grpSpPr>
+      <p:sp>
+        <p:nvSpPr>
+          <p:cNvPr id="2" name="Title 1"/>
+          <p:cNvSpPr>
+            <a:spLocks noGrp="1"/>
+          </p:cNvSpPr>
+          <p:nvPr>
+            <p:ph type="title"/>
+          </p:nvPr>
+        </p:nvSpPr>
+        <p:spPr/>
+        <p:txBody>
+          <a:bodyPr>
+            <a:normAutofit/>
+          </a:bodyPr>
+          <a:lstStyle/>
+          <a:p>
+            <a:r>
+              <a:rPr lang="en-US" dirty="0"/>
+              <a:t>Module Components</a:t>
+            </a:r>
+          </a:p>
+        </p:txBody>
+      </p:sp>
+      <p:graphicFrame>
+        <p:nvGraphicFramePr>
+          <p:cNvPr id="5" name="Content Placeholder 4"/>
+          <p:cNvGraphicFramePr>
+            <a:graphicFrameLocks noGrp="1"/>
+          </p:cNvGraphicFramePr>
+          <p:nvPr>
+            <p:ph sz="half" idx="1"/>
+            <p:extLst/>
+          </p:nvPr>
+        </p:nvGraphicFramePr>
+        <p:xfrm>
+          <a:off x="838200" y="1825625"/>
+          <a:ext cx="5181600" cy="4351338"/>
+        </p:xfrm>
+        <a:graphic>
+          <a:graphicData uri="http://schemas.openxmlformats.org/drawingml/2006/diagram">
+            <dgm:relIds xmlns:dgm="http://schemas.openxmlformats.org/drawingml/2006/diagram" xmlns:r="http://schemas.openxmlformats.org/officeDocument/2006/relationships" r:dm="rId3" r:lo="rId4" r:qs="rId5" r:cs="rId6"/>
+          </a:graphicData>
+        </a:graphic>
+      </p:graphicFrame>
+      <p:sp>
+        <p:nvSpPr>
+          <p:cNvPr id="3" name="Content Placeholder 2">
+            <a:extLst>
+              <a:ext uri="{FF2B5EF4-FFF2-40B4-BE49-F238E27FC236}">
                 <a16:creationId xmlns:a16="http://schemas.microsoft.com/office/drawing/2014/main" id="{7634A784-59FC-493E-B49A-2CB75A66321E}"/>
               </a:ext>
             </a:extLst>
@@ -15561,7 +16096,7 @@
 </p:sld>
 </file>
 
-<file path=ppt/slides/slide12.xml><?xml version="1.0" encoding="utf-8"?>
+<file path=ppt/slides/slide13.xml><?xml version="1.0" encoding="utf-8"?>
 <p:sld xmlns:a="http://schemas.openxmlformats.org/drawingml/2006/main" xmlns:r="http://schemas.openxmlformats.org/officeDocument/2006/relationships" xmlns:p="http://schemas.openxmlformats.org/presentationml/2006/main">
   <p:cSld>
     <p:spTree>
@@ -15649,7 +16184,7 @@
 </p:sld>
 </file>
 
-<file path=ppt/slides/slide13.xml><?xml version="1.0" encoding="utf-8"?>
+<file path=ppt/slides/slide14.xml><?xml version="1.0" encoding="utf-8"?>
 <p:sld xmlns:a="http://schemas.openxmlformats.org/drawingml/2006/main" xmlns:r="http://schemas.openxmlformats.org/officeDocument/2006/relationships" xmlns:p="http://schemas.openxmlformats.org/presentationml/2006/main">
   <p:cSld>
     <p:spTree>
@@ -16359,7 +16894,7 @@
 </p:sld>
 </file>
 
-<file path=ppt/slides/slide14.xml><?xml version="1.0" encoding="utf-8"?>
+<file path=ppt/slides/slide15.xml><?xml version="1.0" encoding="utf-8"?>
 <p:sld xmlns:a="http://schemas.openxmlformats.org/drawingml/2006/main" xmlns:r="http://schemas.openxmlformats.org/officeDocument/2006/relationships" xmlns:p="http://schemas.openxmlformats.org/presentationml/2006/main">
   <p:cSld>
     <p:spTree>
@@ -16378,42 +16913,20 @@
       </p:grpSpPr>
       <p:sp>
         <p:nvSpPr>
-          <p:cNvPr id="2" name="Title 1"/>
-          <p:cNvSpPr>
-            <a:spLocks noGrp="1"/>
-          </p:cNvSpPr>
-          <p:nvPr>
-            <p:ph type="title"/>
-          </p:nvPr>
-        </p:nvSpPr>
-        <p:spPr/>
-        <p:txBody>
-          <a:bodyPr/>
-          <a:lstStyle/>
-          <a:p>
-            <a:r>
-              <a:rPr lang="en-US" dirty="0"/>
-              <a:t>Engine</a:t>
-            </a:r>
-          </a:p>
-        </p:txBody>
-      </p:sp>
-      <p:sp>
-        <p:nvSpPr>
-          <p:cNvPr id="4" name="Rounded Rectangle 3"/>
+          <p:cNvPr id="28" name="Rounded Rectangle 5"/>
           <p:cNvSpPr/>
           <p:nvPr/>
         </p:nvSpPr>
         <p:spPr>
           <a:xfrm>
-            <a:off x="2910103" y="2841804"/>
+            <a:off x="7282433" y="2993212"/>
             <a:ext cx="1828800" cy="771787"/>
           </a:xfrm>
           <a:prstGeom prst="roundRect">
             <a:avLst/>
           </a:prstGeom>
           <a:solidFill>
-            <a:schemeClr val="accent1"/>
+            <a:schemeClr val="accent3"/>
           </a:solidFill>
           <a:ln w="28575">
             <a:solidFill>
@@ -16449,20 +16962,76 @@
             <a:pPr algn="ctr"/>
             <a:r>
               <a:rPr lang="en-US" dirty="0"/>
-              <a:t>Input</a:t>
+              <a:t>Output</a:t>
             </a:r>
           </a:p>
         </p:txBody>
       </p:sp>
       <p:sp>
         <p:nvSpPr>
-          <p:cNvPr id="5" name="Rounded Rectangle 4"/>
+          <p:cNvPr id="27" name="Rounded Rectangle 5"/>
           <p:cNvSpPr/>
           <p:nvPr/>
         </p:nvSpPr>
         <p:spPr>
           <a:xfrm>
-            <a:off x="5019932" y="2841803"/>
+            <a:off x="7214696" y="2917507"/>
+            <a:ext cx="1828800" cy="771787"/>
+          </a:xfrm>
+          <a:prstGeom prst="roundRect">
+            <a:avLst/>
+          </a:prstGeom>
+          <a:solidFill>
+            <a:schemeClr val="accent3"/>
+          </a:solidFill>
+          <a:ln w="28575">
+            <a:solidFill>
+              <a:schemeClr val="tx1"/>
+            </a:solidFill>
+          </a:ln>
+          <a:effectLst>
+            <a:outerShdw blurRad="50800" dist="38100" dir="2700000" algn="tl" rotWithShape="0">
+              <a:prstClr val="black">
+                <a:alpha val="40000"/>
+              </a:prstClr>
+            </a:outerShdw>
+          </a:effectLst>
+        </p:spPr>
+        <p:style>
+          <a:lnRef idx="1">
+            <a:schemeClr val="accent1"/>
+          </a:lnRef>
+          <a:fillRef idx="3">
+            <a:schemeClr val="accent1"/>
+          </a:fillRef>
+          <a:effectRef idx="2">
+            <a:schemeClr val="accent1"/>
+          </a:effectRef>
+          <a:fontRef idx="minor">
+            <a:schemeClr val="lt1"/>
+          </a:fontRef>
+        </p:style>
+        <p:txBody>
+          <a:bodyPr rtlCol="0" anchor="ctr"/>
+          <a:lstStyle/>
+          <a:p>
+            <a:pPr algn="ctr"/>
+            <a:r>
+              <a:rPr lang="en-US" dirty="0"/>
+              <a:t>Output</a:t>
+            </a:r>
+          </a:p>
+        </p:txBody>
+      </p:sp>
+      <p:sp>
+        <p:nvSpPr>
+          <p:cNvPr id="24" name="Rounded Rectangle 4"/>
+          <p:cNvSpPr/>
+          <p:nvPr/>
+        </p:nvSpPr>
+        <p:spPr>
+          <a:xfrm>
+            <a:off x="5147436" y="3017116"/>
             <a:ext cx="1828800" cy="771787"/>
           </a:xfrm>
           <a:prstGeom prst="roundRect">
@@ -16512,13 +17081,315 @@
       </p:sp>
       <p:sp>
         <p:nvSpPr>
+          <p:cNvPr id="23" name="Rounded Rectangle 4"/>
+          <p:cNvSpPr/>
+          <p:nvPr/>
+        </p:nvSpPr>
+        <p:spPr>
+          <a:xfrm>
+            <a:off x="5079705" y="2925481"/>
+            <a:ext cx="1828800" cy="771787"/>
+          </a:xfrm>
+          <a:prstGeom prst="roundRect">
+            <a:avLst/>
+          </a:prstGeom>
+          <a:solidFill>
+            <a:schemeClr val="accent2"/>
+          </a:solidFill>
+          <a:ln w="28575">
+            <a:solidFill>
+              <a:schemeClr val="tx1"/>
+            </a:solidFill>
+          </a:ln>
+          <a:effectLst>
+            <a:outerShdw blurRad="50800" dist="38100" dir="2700000" algn="tl" rotWithShape="0">
+              <a:prstClr val="black">
+                <a:alpha val="40000"/>
+              </a:prstClr>
+            </a:outerShdw>
+          </a:effectLst>
+        </p:spPr>
+        <p:style>
+          <a:lnRef idx="1">
+            <a:schemeClr val="accent1"/>
+          </a:lnRef>
+          <a:fillRef idx="3">
+            <a:schemeClr val="accent1"/>
+          </a:fillRef>
+          <a:effectRef idx="2">
+            <a:schemeClr val="accent1"/>
+          </a:effectRef>
+          <a:fontRef idx="minor">
+            <a:schemeClr val="lt1"/>
+          </a:fontRef>
+        </p:style>
+        <p:txBody>
+          <a:bodyPr rtlCol="0" anchor="ctr"/>
+          <a:lstStyle/>
+          <a:p>
+            <a:pPr algn="ctr"/>
+            <a:r>
+              <a:rPr lang="en-US" dirty="0"/>
+              <a:t>Process</a:t>
+            </a:r>
+          </a:p>
+        </p:txBody>
+      </p:sp>
+      <p:sp>
+        <p:nvSpPr>
+          <p:cNvPr id="20" name="Rounded Rectangle 3"/>
+          <p:cNvSpPr/>
+          <p:nvPr/>
+        </p:nvSpPr>
+        <p:spPr>
+          <a:xfrm>
+            <a:off x="3216361" y="3017125"/>
+            <a:ext cx="1662545" cy="771787"/>
+          </a:xfrm>
+          <a:prstGeom prst="roundRect">
+            <a:avLst/>
+          </a:prstGeom>
+          <a:solidFill>
+            <a:schemeClr val="accent1"/>
+          </a:solidFill>
+          <a:ln w="28575">
+            <a:solidFill>
+              <a:schemeClr val="tx1"/>
+            </a:solidFill>
+          </a:ln>
+          <a:effectLst>
+            <a:outerShdw blurRad="50800" dist="38100" dir="2700000" algn="tl" rotWithShape="0">
+              <a:prstClr val="black">
+                <a:alpha val="40000"/>
+              </a:prstClr>
+            </a:outerShdw>
+          </a:effectLst>
+        </p:spPr>
+        <p:style>
+          <a:lnRef idx="1">
+            <a:schemeClr val="accent1"/>
+          </a:lnRef>
+          <a:fillRef idx="3">
+            <a:schemeClr val="accent1"/>
+          </a:fillRef>
+          <a:effectRef idx="2">
+            <a:schemeClr val="accent1"/>
+          </a:effectRef>
+          <a:fontRef idx="minor">
+            <a:schemeClr val="lt1"/>
+          </a:fontRef>
+        </p:style>
+        <p:txBody>
+          <a:bodyPr rtlCol="0" anchor="ctr"/>
+          <a:lstStyle/>
+          <a:p>
+            <a:pPr algn="ctr"/>
+            <a:r>
+              <a:rPr lang="en-US" dirty="0"/>
+              <a:t>Input</a:t>
+            </a:r>
+          </a:p>
+        </p:txBody>
+      </p:sp>
+      <p:sp>
+        <p:nvSpPr>
+          <p:cNvPr id="19" name="Rounded Rectangle 3"/>
+          <p:cNvSpPr/>
+          <p:nvPr/>
+        </p:nvSpPr>
+        <p:spPr>
+          <a:xfrm>
+            <a:off x="3140652" y="2933449"/>
+            <a:ext cx="1662545" cy="771787"/>
+          </a:xfrm>
+          <a:prstGeom prst="roundRect">
+            <a:avLst/>
+          </a:prstGeom>
+          <a:solidFill>
+            <a:schemeClr val="accent1"/>
+          </a:solidFill>
+          <a:ln w="28575">
+            <a:solidFill>
+              <a:schemeClr val="tx1"/>
+            </a:solidFill>
+          </a:ln>
+          <a:effectLst>
+            <a:outerShdw blurRad="50800" dist="38100" dir="2700000" algn="tl" rotWithShape="0">
+              <a:prstClr val="black">
+                <a:alpha val="40000"/>
+              </a:prstClr>
+            </a:outerShdw>
+          </a:effectLst>
+        </p:spPr>
+        <p:style>
+          <a:lnRef idx="1">
+            <a:schemeClr val="accent1"/>
+          </a:lnRef>
+          <a:fillRef idx="3">
+            <a:schemeClr val="accent1"/>
+          </a:fillRef>
+          <a:effectRef idx="2">
+            <a:schemeClr val="accent1"/>
+          </a:effectRef>
+          <a:fontRef idx="minor">
+            <a:schemeClr val="lt1"/>
+          </a:fontRef>
+        </p:style>
+        <p:txBody>
+          <a:bodyPr rtlCol="0" anchor="ctr"/>
+          <a:lstStyle/>
+          <a:p>
+            <a:pPr algn="ctr"/>
+            <a:r>
+              <a:rPr lang="en-US" dirty="0"/>
+              <a:t>Input</a:t>
+            </a:r>
+          </a:p>
+        </p:txBody>
+      </p:sp>
+      <p:sp>
+        <p:nvSpPr>
+          <p:cNvPr id="2" name="Title 1"/>
+          <p:cNvSpPr>
+            <a:spLocks noGrp="1"/>
+          </p:cNvSpPr>
+          <p:nvPr>
+            <p:ph type="title"/>
+          </p:nvPr>
+        </p:nvSpPr>
+        <p:spPr/>
+        <p:txBody>
+          <a:bodyPr/>
+          <a:lstStyle/>
+          <a:p>
+            <a:r>
+              <a:rPr lang="en-US" dirty="0"/>
+              <a:t>DCAF Engine</a:t>
+            </a:r>
+          </a:p>
+        </p:txBody>
+      </p:sp>
+      <p:sp>
+        <p:nvSpPr>
+          <p:cNvPr id="4" name="Rounded Rectangle 3"/>
+          <p:cNvSpPr/>
+          <p:nvPr/>
+        </p:nvSpPr>
+        <p:spPr>
+          <a:xfrm>
+            <a:off x="2910103" y="2841805"/>
+            <a:ext cx="1828800" cy="771787"/>
+          </a:xfrm>
+          <a:prstGeom prst="roundRect">
+            <a:avLst/>
+          </a:prstGeom>
+          <a:solidFill>
+            <a:schemeClr val="accent1"/>
+          </a:solidFill>
+          <a:ln w="28575">
+            <a:solidFill>
+              <a:schemeClr val="tx1"/>
+            </a:solidFill>
+          </a:ln>
+          <a:effectLst>
+            <a:outerShdw blurRad="50800" dist="38100" dir="2700000" algn="tl" rotWithShape="0">
+              <a:prstClr val="black">
+                <a:alpha val="40000"/>
+              </a:prstClr>
+            </a:outerShdw>
+          </a:effectLst>
+        </p:spPr>
+        <p:style>
+          <a:lnRef idx="1">
+            <a:schemeClr val="accent1"/>
+          </a:lnRef>
+          <a:fillRef idx="3">
+            <a:schemeClr val="accent1"/>
+          </a:fillRef>
+          <a:effectRef idx="2">
+            <a:schemeClr val="accent1"/>
+          </a:effectRef>
+          <a:fontRef idx="minor">
+            <a:schemeClr val="lt1"/>
+          </a:fontRef>
+        </p:style>
+        <p:txBody>
+          <a:bodyPr rtlCol="0" anchor="ctr"/>
+          <a:lstStyle/>
+          <a:p>
+            <a:pPr algn="ctr"/>
+            <a:r>
+              <a:rPr lang="en-US" dirty="0"/>
+              <a:t>Input</a:t>
+            </a:r>
+          </a:p>
+        </p:txBody>
+      </p:sp>
+      <p:sp>
+        <p:nvSpPr>
+          <p:cNvPr id="5" name="Rounded Rectangle 4"/>
+          <p:cNvSpPr/>
+          <p:nvPr/>
+        </p:nvSpPr>
+        <p:spPr>
+          <a:xfrm>
+            <a:off x="5019932" y="2841804"/>
+            <a:ext cx="1828800" cy="771787"/>
+          </a:xfrm>
+          <a:prstGeom prst="roundRect">
+            <a:avLst/>
+          </a:prstGeom>
+          <a:solidFill>
+            <a:schemeClr val="accent2"/>
+          </a:solidFill>
+          <a:ln w="28575">
+            <a:solidFill>
+              <a:schemeClr val="tx1"/>
+            </a:solidFill>
+          </a:ln>
+          <a:effectLst>
+            <a:outerShdw blurRad="50800" dist="38100" dir="2700000" algn="tl" rotWithShape="0">
+              <a:prstClr val="black">
+                <a:alpha val="40000"/>
+              </a:prstClr>
+            </a:outerShdw>
+          </a:effectLst>
+        </p:spPr>
+        <p:style>
+          <a:lnRef idx="1">
+            <a:schemeClr val="accent1"/>
+          </a:lnRef>
+          <a:fillRef idx="3">
+            <a:schemeClr val="accent1"/>
+          </a:fillRef>
+          <a:effectRef idx="2">
+            <a:schemeClr val="accent1"/>
+          </a:effectRef>
+          <a:fontRef idx="minor">
+            <a:schemeClr val="lt1"/>
+          </a:fontRef>
+        </p:style>
+        <p:txBody>
+          <a:bodyPr rtlCol="0" anchor="ctr"/>
+          <a:lstStyle/>
+          <a:p>
+            <a:pPr algn="ctr"/>
+            <a:r>
+              <a:rPr lang="en-US" dirty="0"/>
+              <a:t>Process</a:t>
+            </a:r>
+          </a:p>
+        </p:txBody>
+      </p:sp>
+      <p:sp>
+        <p:nvSpPr>
           <p:cNvPr id="6" name="Rounded Rectangle 5"/>
           <p:cNvSpPr/>
           <p:nvPr/>
         </p:nvSpPr>
         <p:spPr>
           <a:xfrm>
-            <a:off x="7154929" y="2841803"/>
+            <a:off x="7154929" y="2841804"/>
             <a:ext cx="1828800" cy="771787"/>
           </a:xfrm>
           <a:prstGeom prst="roundRect">
@@ -16574,7 +17445,7 @@
         </p:nvSpPr>
         <p:spPr>
           <a:xfrm>
-            <a:off x="2851379" y="1367438"/>
+            <a:off x="2851380" y="1367439"/>
             <a:ext cx="6165907" cy="771787"/>
           </a:xfrm>
           <a:prstGeom prst="roundRect">
@@ -16632,7 +17503,7 @@
         </p:nvSpPr>
         <p:spPr>
           <a:xfrm>
-            <a:off x="3637381" y="2160918"/>
+            <a:off x="3637382" y="2160919"/>
             <a:ext cx="251671" cy="680885"/>
           </a:xfrm>
           <a:prstGeom prst="upArrow">
@@ -16683,7 +17554,7 @@
         </p:nvSpPr>
         <p:spPr>
           <a:xfrm rot="10800000">
-            <a:off x="7916437" y="2153688"/>
+            <a:off x="7916438" y="2153688"/>
             <a:ext cx="251671" cy="680885"/>
           </a:xfrm>
           <a:prstGeom prst="upArrow">
@@ -16734,7 +17605,7 @@
         </p:nvSpPr>
         <p:spPr>
           <a:xfrm rot="10800000">
-            <a:off x="5270319" y="2160918"/>
+            <a:off x="5270321" y="2160919"/>
             <a:ext cx="251671" cy="680885"/>
           </a:xfrm>
           <a:prstGeom prst="upArrow">
@@ -16785,7 +17656,7 @@
         </p:nvSpPr>
         <p:spPr>
           <a:xfrm>
-            <a:off x="6157663" y="2139225"/>
+            <a:off x="6157665" y="2139226"/>
             <a:ext cx="251671" cy="680885"/>
           </a:xfrm>
           <a:prstGeom prst="upArrow">
@@ -16836,7 +17707,7 @@
         </p:nvSpPr>
         <p:spPr>
           <a:xfrm>
-            <a:off x="4951828" y="4146698"/>
+            <a:off x="4951830" y="4146699"/>
             <a:ext cx="1896903" cy="839972"/>
           </a:xfrm>
           <a:prstGeom prst="cloud">
@@ -16875,7 +17746,7 @@
                   <a:schemeClr val="tx1"/>
                 </a:solidFill>
               </a:rPr>
-              <a:t>Outside</a:t>
+              <a:t>Outside?</a:t>
             </a:r>
           </a:p>
         </p:txBody>
@@ -16888,7 +17759,7 @@
         </p:nvSpPr>
         <p:spPr>
           <a:xfrm>
-            <a:off x="3076489" y="4146698"/>
+            <a:off x="3076490" y="4146699"/>
             <a:ext cx="1373453" cy="839972"/>
           </a:xfrm>
           <a:prstGeom prst="cloud">
@@ -16940,7 +17811,7 @@
         </p:nvSpPr>
         <p:spPr>
           <a:xfrm>
-            <a:off x="7355545" y="4146698"/>
+            <a:off x="7355546" y="4146699"/>
             <a:ext cx="1373453" cy="839972"/>
           </a:xfrm>
           <a:prstGeom prst="cloud">
@@ -16992,7 +17863,7 @@
         </p:nvSpPr>
         <p:spPr>
           <a:xfrm>
-            <a:off x="3634917" y="3620820"/>
+            <a:off x="3634918" y="3620820"/>
             <a:ext cx="251671" cy="680885"/>
           </a:xfrm>
           <a:prstGeom prst="upArrow">
@@ -17045,58 +17916,7 @@
         </p:nvSpPr>
         <p:spPr>
           <a:xfrm rot="10800000">
-            <a:off x="7913973" y="3613590"/>
-            <a:ext cx="251671" cy="680885"/>
-          </a:xfrm>
-          <a:prstGeom prst="upArrow">
-            <a:avLst/>
-          </a:prstGeom>
-          <a:solidFill>
-            <a:schemeClr val="tx1"/>
-          </a:solidFill>
-          <a:ln>
-            <a:noFill/>
-          </a:ln>
-          <a:effectLst>
-            <a:outerShdw blurRad="50800" dist="38100" dir="2700000" algn="tl" rotWithShape="0">
-              <a:prstClr val="black">
-                <a:alpha val="40000"/>
-              </a:prstClr>
-            </a:outerShdw>
-          </a:effectLst>
-        </p:spPr>
-        <p:style>
-          <a:lnRef idx="1">
-            <a:schemeClr val="accent1"/>
-          </a:lnRef>
-          <a:fillRef idx="3">
-            <a:schemeClr val="accent1"/>
-          </a:fillRef>
-          <a:effectRef idx="2">
-            <a:schemeClr val="accent1"/>
-          </a:effectRef>
-          <a:fontRef idx="minor">
-            <a:schemeClr val="lt1"/>
-          </a:fontRef>
-        </p:style>
-        <p:txBody>
-          <a:bodyPr rtlCol="0" anchor="ctr"/>
-          <a:lstStyle/>
-          <a:p>
-            <a:pPr algn="ctr"/>
-            <a:endParaRPr lang="en-US"/>
-          </a:p>
-        </p:txBody>
-      </p:sp>
-      <p:sp>
-        <p:nvSpPr>
-          <p:cNvPr id="25" name="Up Arrow 24"/>
-          <p:cNvSpPr/>
-          <p:nvPr/>
-        </p:nvSpPr>
-        <p:spPr>
-          <a:xfrm rot="10800000">
-            <a:off x="5281302" y="3620820"/>
+            <a:off x="7913974" y="3613591"/>
             <a:ext cx="251671" cy="680885"/>
           </a:xfrm>
           <a:prstGeom prst="upArrow">
@@ -17143,13 +17963,13 @@
       </p:sp>
       <p:sp>
         <p:nvSpPr>
-          <p:cNvPr id="26" name="Up Arrow 25"/>
+          <p:cNvPr id="25" name="Up Arrow 24"/>
           <p:cNvSpPr/>
           <p:nvPr/>
         </p:nvSpPr>
         <p:spPr>
-          <a:xfrm>
-            <a:off x="6168646" y="3599127"/>
+          <a:xfrm rot="10800000">
+            <a:off x="5281303" y="3620820"/>
             <a:ext cx="251671" cy="680885"/>
           </a:xfrm>
           <a:prstGeom prst="upArrow">
@@ -17194,10 +18014,182 @@
           </a:p>
         </p:txBody>
       </p:sp>
+      <p:sp>
+        <p:nvSpPr>
+          <p:cNvPr id="26" name="Up Arrow 25"/>
+          <p:cNvSpPr/>
+          <p:nvPr/>
+        </p:nvSpPr>
+        <p:spPr>
+          <a:xfrm>
+            <a:off x="6168647" y="3599128"/>
+            <a:ext cx="251671" cy="680885"/>
+          </a:xfrm>
+          <a:prstGeom prst="upArrow">
+            <a:avLst/>
+          </a:prstGeom>
+          <a:solidFill>
+            <a:schemeClr val="bg2">
+              <a:lumMod val="75000"/>
+            </a:schemeClr>
+          </a:solidFill>
+          <a:ln>
+            <a:noFill/>
+          </a:ln>
+          <a:effectLst>
+            <a:outerShdw blurRad="50800" dist="38100" dir="2700000" algn="tl" rotWithShape="0">
+              <a:prstClr val="black">
+                <a:alpha val="40000"/>
+              </a:prstClr>
+            </a:outerShdw>
+          </a:effectLst>
+        </p:spPr>
+        <p:style>
+          <a:lnRef idx="1">
+            <a:schemeClr val="accent1"/>
+          </a:lnRef>
+          <a:fillRef idx="3">
+            <a:schemeClr val="accent1"/>
+          </a:fillRef>
+          <a:effectRef idx="2">
+            <a:schemeClr val="accent1"/>
+          </a:effectRef>
+          <a:fontRef idx="minor">
+            <a:schemeClr val="lt1"/>
+          </a:fontRef>
+        </p:style>
+        <p:txBody>
+          <a:bodyPr rtlCol="0" anchor="ctr"/>
+          <a:lstStyle/>
+          <a:p>
+            <a:pPr algn="ctr"/>
+            <a:endParaRPr lang="en-US"/>
+          </a:p>
+        </p:txBody>
+      </p:sp>
+      <p:sp>
+        <p:nvSpPr>
+          <p:cNvPr id="3" name="Rectangle: Rounded Corners 2"/>
+          <p:cNvSpPr/>
+          <p:nvPr/>
+        </p:nvSpPr>
+        <p:spPr>
+          <a:xfrm>
+            <a:off x="422850" y="2898576"/>
+            <a:ext cx="1593727" cy="795691"/>
+          </a:xfrm>
+          <a:prstGeom prst="roundRect">
+            <a:avLst/>
+          </a:prstGeom>
+          <a:noFill/>
+          <a:ln w="12700">
+            <a:solidFill>
+              <a:srgbClr val="0A60A3"/>
+            </a:solidFill>
+          </a:ln>
+          <a:effectLst/>
+        </p:spPr>
+        <p:style>
+          <a:lnRef idx="1">
+            <a:schemeClr val="accent1"/>
+          </a:lnRef>
+          <a:fillRef idx="3">
+            <a:schemeClr val="accent1"/>
+          </a:fillRef>
+          <a:effectRef idx="2">
+            <a:schemeClr val="accent1"/>
+          </a:effectRef>
+          <a:fontRef idx="minor">
+            <a:schemeClr val="lt1"/>
+          </a:fontRef>
+        </p:style>
+        <p:txBody>
+          <a:bodyPr rot="0" spcFirstLastPara="0" vertOverflow="overflow" horzOverflow="overflow" vert="horz" wrap="square" lIns="0" tIns="60960" rIns="0" bIns="60960" numCol="1" spcCol="0" rtlCol="0" fromWordArt="0" anchor="ctr" anchorCtr="0" forceAA="0" compatLnSpc="1">
+            <a:prstTxWarp prst="textNoShape">
+              <a:avLst/>
+            </a:prstTxWarp>
+            <a:noAutofit/>
+          </a:bodyPr>
+          <a:lstStyle/>
+          <a:p>
+            <a:pPr algn="ctr"/>
+            <a:r>
+              <a:rPr lang="en-US" sz="2400" dirty="0" err="1">
+                <a:solidFill>
+                  <a:schemeClr val="tx1"/>
+                </a:solidFill>
+              </a:rPr>
+              <a:t>Init</a:t>
+            </a:r>
+            <a:endParaRPr lang="en-US" sz="2400" dirty="0">
+              <a:solidFill>
+                <a:schemeClr val="tx1"/>
+              </a:solidFill>
+            </a:endParaRPr>
+          </a:p>
+        </p:txBody>
+      </p:sp>
+      <p:sp>
+        <p:nvSpPr>
+          <p:cNvPr id="29" name="Rectangle: Rounded Corners 28"/>
+          <p:cNvSpPr/>
+          <p:nvPr/>
+        </p:nvSpPr>
+        <p:spPr>
+          <a:xfrm>
+            <a:off x="9921467" y="2938427"/>
+            <a:ext cx="1593727" cy="795691"/>
+          </a:xfrm>
+          <a:prstGeom prst="roundRect">
+            <a:avLst/>
+          </a:prstGeom>
+          <a:noFill/>
+          <a:ln w="12700">
+            <a:solidFill>
+              <a:srgbClr val="0A60A3"/>
+            </a:solidFill>
+          </a:ln>
+          <a:effectLst/>
+        </p:spPr>
+        <p:style>
+          <a:lnRef idx="1">
+            <a:schemeClr val="accent1"/>
+          </a:lnRef>
+          <a:fillRef idx="3">
+            <a:schemeClr val="accent1"/>
+          </a:fillRef>
+          <a:effectRef idx="2">
+            <a:schemeClr val="accent1"/>
+          </a:effectRef>
+          <a:fontRef idx="minor">
+            <a:schemeClr val="lt1"/>
+          </a:fontRef>
+        </p:style>
+        <p:txBody>
+          <a:bodyPr rot="0" spcFirstLastPara="0" vertOverflow="overflow" horzOverflow="overflow" vert="horz" wrap="square" lIns="0" tIns="60960" rIns="0" bIns="60960" numCol="1" spcCol="0" rtlCol="0" fromWordArt="0" anchor="ctr" anchorCtr="0" forceAA="0" compatLnSpc="1">
+            <a:prstTxWarp prst="textNoShape">
+              <a:avLst/>
+            </a:prstTxWarp>
+            <a:noAutofit/>
+          </a:bodyPr>
+          <a:lstStyle/>
+          <a:p>
+            <a:pPr algn="ctr"/>
+            <a:r>
+              <a:rPr lang="en-US" sz="2400" dirty="0">
+                <a:solidFill>
+                  <a:schemeClr val="tx1"/>
+                </a:solidFill>
+              </a:rPr>
+              <a:t>Close</a:t>
+            </a:r>
+          </a:p>
+        </p:txBody>
+      </p:sp>
     </p:spTree>
     <p:extLst>
       <p:ext uri="{BB962C8B-B14F-4D97-AF65-F5344CB8AC3E}">
-        <p14:creationId xmlns:p14="http://schemas.microsoft.com/office/powerpoint/2010/main" val="3247749521"/>
+        <p14:creationId xmlns:p14="http://schemas.microsoft.com/office/powerpoint/2010/main" val="4063207288"/>
       </p:ext>
     </p:extLst>
   </p:cSld>
@@ -17207,7 +18199,7 @@
 </p:sld>
 </file>
 
-<file path=ppt/slides/slide15.xml><?xml version="1.0" encoding="utf-8"?>
+<file path=ppt/slides/slide16.xml><?xml version="1.0" encoding="utf-8"?>
 <p:sld xmlns:a="http://schemas.openxmlformats.org/drawingml/2006/main" xmlns:r="http://schemas.openxmlformats.org/officeDocument/2006/relationships" xmlns:p="http://schemas.openxmlformats.org/presentationml/2006/main">
   <p:cSld>
     <p:spTree>
@@ -19600,7 +20592,7 @@
 </p:sld>
 </file>
 
-<file path=ppt/slides/slide16.xml><?xml version="1.0" encoding="utf-8"?>
+<file path=ppt/slides/slide17.xml><?xml version="1.0" encoding="utf-8"?>
 <p:sld xmlns:a="http://schemas.openxmlformats.org/drawingml/2006/main" xmlns:r="http://schemas.openxmlformats.org/officeDocument/2006/relationships" xmlns:p="http://schemas.openxmlformats.org/presentationml/2006/main">
   <p:cSld>
     <p:spTree>
@@ -19690,7 +20682,7 @@
 </p:sld>
 </file>
 
-<file path=ppt/slides/slide17.xml><?xml version="1.0" encoding="utf-8"?>
+<file path=ppt/slides/slide18.xml><?xml version="1.0" encoding="utf-8"?>
 <p:sld xmlns:a="http://schemas.openxmlformats.org/drawingml/2006/main" xmlns:r="http://schemas.openxmlformats.org/officeDocument/2006/relationships" xmlns:p="http://schemas.openxmlformats.org/presentationml/2006/main">
   <p:cSld>
     <p:spTree>
@@ -20094,7 +21086,7 @@
 </p:sld>
 </file>
 
-<file path=ppt/slides/slide18.xml><?xml version="1.0" encoding="utf-8"?>
+<file path=ppt/slides/slide19.xml><?xml version="1.0" encoding="utf-8"?>
 <p:sld xmlns:a="http://schemas.openxmlformats.org/drawingml/2006/main" xmlns:r="http://schemas.openxmlformats.org/officeDocument/2006/relationships" xmlns:p="http://schemas.openxmlformats.org/presentationml/2006/main">
   <p:cSld>
     <p:spTree>
@@ -20262,7 +21254,142 @@
 </p:sld>
 </file>
 
-<file path=ppt/slides/slide19.xml><?xml version="1.0" encoding="utf-8"?>
+<file path=ppt/slides/slide2.xml><?xml version="1.0" encoding="utf-8"?>
+<p:sld xmlns:a="http://schemas.openxmlformats.org/drawingml/2006/main" xmlns:r="http://schemas.openxmlformats.org/officeDocument/2006/relationships" xmlns:p="http://schemas.openxmlformats.org/presentationml/2006/main">
+  <p:cSld>
+    <p:spTree>
+      <p:nvGrpSpPr>
+        <p:cNvPr id="1" name=""/>
+        <p:cNvGrpSpPr/>
+        <p:nvPr/>
+      </p:nvGrpSpPr>
+      <p:grpSpPr>
+        <a:xfrm>
+          <a:off x="0" y="0"/>
+          <a:ext cx="0" cy="0"/>
+          <a:chOff x="0" y="0"/>
+          <a:chExt cx="0" cy="0"/>
+        </a:xfrm>
+      </p:grpSpPr>
+      <p:sp>
+        <p:nvSpPr>
+          <p:cNvPr id="6" name="Title 5"/>
+          <p:cNvSpPr>
+            <a:spLocks noGrp="1"/>
+          </p:cNvSpPr>
+          <p:nvPr>
+            <p:ph type="title"/>
+          </p:nvPr>
+        </p:nvSpPr>
+        <p:spPr/>
+        <p:txBody>
+          <a:bodyPr/>
+          <a:lstStyle/>
+          <a:p>
+            <a:r>
+              <a:rPr lang="en-US" dirty="0"/>
+              <a:t>Agenda</a:t>
+            </a:r>
+          </a:p>
+        </p:txBody>
+      </p:sp>
+      <p:sp>
+        <p:nvSpPr>
+          <p:cNvPr id="7" name="Content Placeholder 6"/>
+          <p:cNvSpPr>
+            <a:spLocks noGrp="1"/>
+          </p:cNvSpPr>
+          <p:nvPr>
+            <p:ph idx="1"/>
+          </p:nvPr>
+        </p:nvSpPr>
+        <p:spPr/>
+        <p:txBody>
+          <a:bodyPr>
+            <a:normAutofit/>
+          </a:bodyPr>
+          <a:lstStyle/>
+          <a:p>
+            <a:r>
+              <a:rPr lang="en-US" sz="2000" dirty="0"/>
+              <a:t>Introduction</a:t>
+            </a:r>
+          </a:p>
+          <a:p>
+            <a:pPr lvl="1"/>
+            <a:r>
+              <a:rPr lang="en-US" sz="2000" dirty="0"/>
+              <a:t>Why should you use DCAF?</a:t>
+            </a:r>
+          </a:p>
+          <a:p>
+            <a:pPr lvl="1"/>
+            <a:r>
+              <a:rPr lang="en-US" sz="2000" dirty="0"/>
+              <a:t>Who should use DCAF?</a:t>
+            </a:r>
+          </a:p>
+          <a:p>
+            <a:r>
+              <a:rPr lang="en-US" sz="2000" dirty="0"/>
+              <a:t>The DCAF Paradigm</a:t>
+            </a:r>
+          </a:p>
+          <a:p>
+            <a:pPr lvl="1"/>
+            <a:r>
+              <a:rPr lang="en-US" sz="2000" dirty="0"/>
+              <a:t>Engine</a:t>
+            </a:r>
+          </a:p>
+          <a:p>
+            <a:pPr lvl="1"/>
+            <a:r>
+              <a:rPr lang="en-US" sz="2000" dirty="0"/>
+              <a:t>Modules</a:t>
+            </a:r>
+          </a:p>
+          <a:p>
+            <a:pPr lvl="1"/>
+            <a:r>
+              <a:rPr lang="en-US" sz="2000" dirty="0"/>
+              <a:t>Configuration</a:t>
+            </a:r>
+          </a:p>
+          <a:p>
+            <a:r>
+              <a:rPr lang="en-US" sz="2000" dirty="0"/>
+              <a:t>Tools and Externalities</a:t>
+            </a:r>
+          </a:p>
+          <a:p>
+            <a:r>
+              <a:rPr lang="en-US" sz="2000" dirty="0"/>
+              <a:t>Nomenclature</a:t>
+            </a:r>
+          </a:p>
+          <a:p>
+            <a:endParaRPr lang="en-US" dirty="0"/>
+          </a:p>
+          <a:p>
+            <a:endParaRPr lang="en-US" dirty="0"/>
+          </a:p>
+        </p:txBody>
+      </p:sp>
+    </p:spTree>
+    <p:extLst>
+      <p:ext uri="{BB962C8B-B14F-4D97-AF65-F5344CB8AC3E}">
+        <p14:creationId xmlns:p14="http://schemas.microsoft.com/office/powerpoint/2010/main" val="353883698"/>
+      </p:ext>
+    </p:extLst>
+  </p:cSld>
+  <p:clrMapOvr>
+    <a:masterClrMapping/>
+  </p:clrMapOvr>
+</p:sld>
+</file>
+
+<file path=ppt/slides/slide20.xml><?xml version="1.0" encoding="utf-8"?>
 <p:sld xmlns:a="http://schemas.openxmlformats.org/drawingml/2006/main" xmlns:r="http://schemas.openxmlformats.org/officeDocument/2006/relationships" xmlns:p="http://schemas.openxmlformats.org/presentationml/2006/main" show="0">
   <p:cSld>
     <p:spTree>
@@ -20352,136 +21479,7 @@
 </p:sld>
 </file>
 
-<file path=ppt/slides/slide2.xml><?xml version="1.0" encoding="utf-8"?>
-<p:sld xmlns:a="http://schemas.openxmlformats.org/drawingml/2006/main" xmlns:r="http://schemas.openxmlformats.org/officeDocument/2006/relationships" xmlns:p="http://schemas.openxmlformats.org/presentationml/2006/main">
-  <p:cSld>
-    <p:spTree>
-      <p:nvGrpSpPr>
-        <p:cNvPr id="1" name=""/>
-        <p:cNvGrpSpPr/>
-        <p:nvPr/>
-      </p:nvGrpSpPr>
-      <p:grpSpPr>
-        <a:xfrm>
-          <a:off x="0" y="0"/>
-          <a:ext cx="0" cy="0"/>
-          <a:chOff x="0" y="0"/>
-          <a:chExt cx="0" cy="0"/>
-        </a:xfrm>
-      </p:grpSpPr>
-      <p:sp>
-        <p:nvSpPr>
-          <p:cNvPr id="6" name="Title 5"/>
-          <p:cNvSpPr>
-            <a:spLocks noGrp="1"/>
-          </p:cNvSpPr>
-          <p:nvPr>
-            <p:ph type="title"/>
-          </p:nvPr>
-        </p:nvSpPr>
-        <p:spPr/>
-        <p:txBody>
-          <a:bodyPr/>
-          <a:lstStyle/>
-          <a:p>
-            <a:r>
-              <a:rPr lang="en-US" dirty="0"/>
-              <a:t>Agenda</a:t>
-            </a:r>
-          </a:p>
-        </p:txBody>
-      </p:sp>
-      <p:sp>
-        <p:nvSpPr>
-          <p:cNvPr id="7" name="Content Placeholder 6"/>
-          <p:cNvSpPr>
-            <a:spLocks noGrp="1"/>
-          </p:cNvSpPr>
-          <p:nvPr>
-            <p:ph idx="1"/>
-          </p:nvPr>
-        </p:nvSpPr>
-        <p:spPr/>
-        <p:txBody>
-          <a:bodyPr>
-            <a:normAutofit/>
-          </a:bodyPr>
-          <a:lstStyle/>
-          <a:p>
-            <a:r>
-              <a:rPr lang="en-US" sz="2000" dirty="0"/>
-              <a:t>Introduction</a:t>
-            </a:r>
-          </a:p>
-          <a:p>
-            <a:pPr lvl="1"/>
-            <a:r>
-              <a:rPr lang="en-US" sz="2000" dirty="0"/>
-              <a:t>Why should you use DCAF?</a:t>
-            </a:r>
-          </a:p>
-          <a:p>
-            <a:pPr lvl="1"/>
-            <a:r>
-              <a:rPr lang="en-US" sz="2000" dirty="0"/>
-              <a:t>Who should use DCAF?</a:t>
-            </a:r>
-          </a:p>
-          <a:p>
-            <a:r>
-              <a:rPr lang="en-US" sz="2000" dirty="0"/>
-              <a:t>The DCAF Paradigm</a:t>
-            </a:r>
-          </a:p>
-          <a:p>
-            <a:pPr lvl="1"/>
-            <a:r>
-              <a:rPr lang="en-US" sz="2000" dirty="0"/>
-              <a:t>Engine</a:t>
-            </a:r>
-          </a:p>
-          <a:p>
-            <a:pPr lvl="1"/>
-            <a:r>
-              <a:rPr lang="en-US" sz="2000" dirty="0"/>
-              <a:t>Modules</a:t>
-            </a:r>
-          </a:p>
-          <a:p>
-            <a:pPr lvl="1"/>
-            <a:r>
-              <a:rPr lang="en-US" sz="2000" dirty="0"/>
-              <a:t>Configuration</a:t>
-            </a:r>
-          </a:p>
-          <a:p>
-            <a:r>
-              <a:rPr lang="en-US" sz="2000" dirty="0"/>
-              <a:t>Tools and Externalities</a:t>
-            </a:r>
-          </a:p>
-          <a:p>
-            <a:endParaRPr lang="en-US" dirty="0"/>
-          </a:p>
-          <a:p>
-            <a:endParaRPr lang="en-US" dirty="0"/>
-          </a:p>
-        </p:txBody>
-      </p:sp>
-    </p:spTree>
-    <p:extLst>
-      <p:ext uri="{BB962C8B-B14F-4D97-AF65-F5344CB8AC3E}">
-        <p14:creationId xmlns:p14="http://schemas.microsoft.com/office/powerpoint/2010/main" val="353883698"/>
-      </p:ext>
-    </p:extLst>
-  </p:cSld>
-  <p:clrMapOvr>
-    <a:masterClrMapping/>
-  </p:clrMapOvr>
-</p:sld>
-</file>
-
-<file path=ppt/slides/slide20.xml><?xml version="1.0" encoding="utf-8"?>
+<file path=ppt/slides/slide21.xml><?xml version="1.0" encoding="utf-8"?>
 <p:sld xmlns:a="http://schemas.openxmlformats.org/drawingml/2006/main" xmlns:r="http://schemas.openxmlformats.org/officeDocument/2006/relationships" xmlns:p="http://schemas.openxmlformats.org/presentationml/2006/main" show="0">
   <p:cSld>
     <p:spTree>
@@ -20569,7 +21567,7 @@
 </p:sld>
 </file>
 
-<file path=ppt/slides/slide21.xml><?xml version="1.0" encoding="utf-8"?>
+<file path=ppt/slides/slide22.xml><?xml version="1.0" encoding="utf-8"?>
 <p:sld xmlns:a="http://schemas.openxmlformats.org/drawingml/2006/main" xmlns:r="http://schemas.openxmlformats.org/officeDocument/2006/relationships" xmlns:p="http://schemas.openxmlformats.org/presentationml/2006/main">
   <p:cSld>
     <p:spTree>
@@ -20687,7 +21685,7 @@
 </p:sld>
 </file>
 
-<file path=ppt/slides/slide22.xml><?xml version="1.0" encoding="utf-8"?>
+<file path=ppt/slides/slide23.xml><?xml version="1.0" encoding="utf-8"?>
 <p:sld xmlns:a="http://schemas.openxmlformats.org/drawingml/2006/main" xmlns:r="http://schemas.openxmlformats.org/officeDocument/2006/relationships" xmlns:p="http://schemas.openxmlformats.org/presentationml/2006/main">
   <p:cSld>
     <p:spTree>
@@ -20798,7 +21796,7 @@
 </p:sld>
 </file>
 
-<file path=ppt/slides/slide23.xml><?xml version="1.0" encoding="utf-8"?>
+<file path=ppt/slides/slide24.xml><?xml version="1.0" encoding="utf-8"?>
 <p:sld xmlns:a="http://schemas.openxmlformats.org/drawingml/2006/main" xmlns:r="http://schemas.openxmlformats.org/officeDocument/2006/relationships" xmlns:p="http://schemas.openxmlformats.org/presentationml/2006/main">
   <p:cSld>
     <p:spTree>
@@ -20983,7 +21981,7 @@
 </p:sld>
 </file>
 
-<file path=ppt/slides/slide24.xml><?xml version="1.0" encoding="utf-8"?>
+<file path=ppt/slides/slide25.xml><?xml version="1.0" encoding="utf-8"?>
 <p:sld xmlns:a="http://schemas.openxmlformats.org/drawingml/2006/main" xmlns:r="http://schemas.openxmlformats.org/officeDocument/2006/relationships" xmlns:p="http://schemas.openxmlformats.org/presentationml/2006/main">
   <p:cSld>
     <p:spTree>
@@ -21065,7 +22063,7 @@
 </p:sld>
 </file>
 
-<file path=ppt/slides/slide25.xml><?xml version="1.0" encoding="utf-8"?>
+<file path=ppt/slides/slide26.xml><?xml version="1.0" encoding="utf-8"?>
 <p:sld xmlns:a="http://schemas.openxmlformats.org/drawingml/2006/main" xmlns:r="http://schemas.openxmlformats.org/officeDocument/2006/relationships" xmlns:p="http://schemas.openxmlformats.org/presentationml/2006/main" show="0">
   <p:cSld>
     <p:spTree>
@@ -21197,7 +22195,7 @@
 </p:sld>
 </file>
 
-<file path=ppt/slides/slide26.xml><?xml version="1.0" encoding="utf-8"?>
+<file path=ppt/slides/slide27.xml><?xml version="1.0" encoding="utf-8"?>
 <p:sld xmlns:a="http://schemas.openxmlformats.org/drawingml/2006/main" xmlns:r="http://schemas.openxmlformats.org/officeDocument/2006/relationships" xmlns:p="http://schemas.openxmlformats.org/presentationml/2006/main" show="0">
   <p:cSld>
     <p:spTree>
@@ -21297,7 +22295,118 @@
 </p:sld>
 </file>
 
-<file path=ppt/slides/slide27.xml><?xml version="1.0" encoding="utf-8"?>
+<file path=ppt/slides/slide28.xml><?xml version="1.0" encoding="utf-8"?>
+<p:sld xmlns:a="http://schemas.openxmlformats.org/drawingml/2006/main" xmlns:r="http://schemas.openxmlformats.org/officeDocument/2006/relationships" xmlns:p="http://schemas.openxmlformats.org/presentationml/2006/main">
+  <p:cSld>
+    <p:spTree>
+      <p:nvGrpSpPr>
+        <p:cNvPr id="1" name=""/>
+        <p:cNvGrpSpPr/>
+        <p:nvPr/>
+      </p:nvGrpSpPr>
+      <p:grpSpPr>
+        <a:xfrm>
+          <a:off x="0" y="0"/>
+          <a:ext cx="0" cy="0"/>
+          <a:chOff x="0" y="0"/>
+          <a:chExt cx="0" cy="0"/>
+        </a:xfrm>
+      </p:grpSpPr>
+      <p:sp>
+        <p:nvSpPr>
+          <p:cNvPr id="2" name="Title 1"/>
+          <p:cNvSpPr>
+            <a:spLocks noGrp="1"/>
+          </p:cNvSpPr>
+          <p:nvPr>
+            <p:ph type="ctrTitle"/>
+          </p:nvPr>
+        </p:nvSpPr>
+        <p:spPr/>
+        <p:txBody>
+          <a:bodyPr/>
+          <a:lstStyle/>
+          <a:p>
+            <a:r>
+              <a:rPr lang="en-US" dirty="0"/>
+              <a:t>Nomenclature</a:t>
+            </a:r>
+          </a:p>
+        </p:txBody>
+      </p:sp>
+      <p:sp>
+        <p:nvSpPr>
+          <p:cNvPr id="4" name="Subtitle 3"/>
+          <p:cNvSpPr>
+            <a:spLocks noGrp="1"/>
+          </p:cNvSpPr>
+          <p:nvPr>
+            <p:ph type="subTitle" idx="1"/>
+          </p:nvPr>
+        </p:nvSpPr>
+        <p:spPr/>
+        <p:txBody>
+          <a:bodyPr/>
+          <a:lstStyle/>
+          <a:p>
+            <a:endParaRPr lang="en-US"/>
+          </a:p>
+        </p:txBody>
+      </p:sp>
+      <p:sp>
+        <p:nvSpPr>
+          <p:cNvPr id="5" name="Text Placeholder 4"/>
+          <p:cNvSpPr>
+            <a:spLocks noGrp="1"/>
+          </p:cNvSpPr>
+          <p:nvPr>
+            <p:ph type="body" sz="quarter" idx="12"/>
+          </p:nvPr>
+        </p:nvSpPr>
+        <p:spPr/>
+        <p:txBody>
+          <a:bodyPr>
+            <a:normAutofit lnSpcReduction="10000"/>
+          </a:bodyPr>
+          <a:lstStyle/>
+          <a:p>
+            <a:endParaRPr lang="en-US"/>
+          </a:p>
+        </p:txBody>
+      </p:sp>
+      <p:sp>
+        <p:nvSpPr>
+          <p:cNvPr id="6" name="Text Placeholder 5"/>
+          <p:cNvSpPr>
+            <a:spLocks noGrp="1"/>
+          </p:cNvSpPr>
+          <p:nvPr>
+            <p:ph type="body" sz="quarter" idx="13"/>
+          </p:nvPr>
+        </p:nvSpPr>
+        <p:spPr/>
+        <p:txBody>
+          <a:bodyPr/>
+          <a:lstStyle/>
+          <a:p>
+            <a:endParaRPr lang="en-US"/>
+          </a:p>
+        </p:txBody>
+      </p:sp>
+    </p:spTree>
+    <p:extLst>
+      <p:ext uri="{BB962C8B-B14F-4D97-AF65-F5344CB8AC3E}">
+        <p14:creationId xmlns:p14="http://schemas.microsoft.com/office/powerpoint/2010/main" val="605354176"/>
+      </p:ext>
+    </p:extLst>
+  </p:cSld>
+  <p:clrMapOvr>
+    <a:masterClrMapping/>
+  </p:clrMapOvr>
+</p:sld>
+</file>
+
+<file path=ppt/slides/slide29.xml><?xml version="1.0" encoding="utf-8"?>
 <p:sld xmlns:a="http://schemas.openxmlformats.org/drawingml/2006/main" xmlns:r="http://schemas.openxmlformats.org/officeDocument/2006/relationships" xmlns:p="http://schemas.openxmlformats.org/presentationml/2006/main">
   <p:cSld>
     <p:spTree>
@@ -24008,7 +25117,7 @@
         </p:nvSpPr>
         <p:spPr>
           <a:xfrm>
-            <a:off x="7363027" y="2094140"/>
+            <a:off x="7363026" y="2201252"/>
             <a:ext cx="4114800" cy="3886200"/>
           </a:xfrm>
           <a:prstGeom prst="roundRect">

</xml_diff>

<commit_message>
Working on ensuring diagram consistency
Went through many of the slide decks to ensure diagrams were consistent. Now they use similar color schemes, use PPT instead of Draw.IO. Also cleaned up the templates from the slide decks.
</commit_message>
<xml_diff>
--- a/Trunk/Getting Started Material/DCAF Training/1 Introduction to DCAF.pptx
+++ b/Trunk/Getting Started Material/DCAF Training/1 Introduction to DCAF.pptx
@@ -5,7 +5,7 @@
     <p:sldMasterId id="2147483783" r:id="rId1"/>
   </p:sldMasterIdLst>
   <p:notesMasterIdLst>
-    <p:notesMasterId r:id="rId30"/>
+    <p:notesMasterId r:id="rId31"/>
   </p:notesMasterIdLst>
   <p:sldIdLst>
     <p:sldId id="259" r:id="rId2"/>
@@ -35,7 +35,8 @@
     <p:sldId id="300" r:id="rId26"/>
     <p:sldId id="293" r:id="rId27"/>
     <p:sldId id="278" r:id="rId28"/>
-    <p:sldId id="286" r:id="rId29"/>
+    <p:sldId id="367" r:id="rId29"/>
+    <p:sldId id="286" r:id="rId30"/>
   </p:sldIdLst>
   <p:sldSz cx="12192000" cy="6858000"/>
   <p:notesSz cx="6858000" cy="9144000"/>
@@ -2612,7 +2613,9 @@
       <dgm:prSet phldrT="[Text]" custT="1"/>
       <dgm:spPr>
         <a:solidFill>
-          <a:schemeClr val="accent3"/>
+          <a:schemeClr val="bg2">
+            <a:lumMod val="50000"/>
+          </a:schemeClr>
         </a:solidFill>
       </dgm:spPr>
       <dgm:t>
@@ -2656,7 +2659,7 @@
       <dgm:prSet phldrT="[Text]"/>
       <dgm:spPr>
         <a:solidFill>
-          <a:schemeClr val="accent4"/>
+          <a:schemeClr val="tx2"/>
         </a:solidFill>
       </dgm:spPr>
       <dgm:t>
@@ -2699,7 +2702,11 @@
     </dgm:pt>
     <dgm:pt modelId="{BE28D08F-D798-48B7-8D61-9CB70080103E}">
       <dgm:prSet phldrT="[Text]"/>
-      <dgm:spPr/>
+      <dgm:spPr>
+        <a:solidFill>
+          <a:srgbClr val="007200"/>
+        </a:solidFill>
+      </dgm:spPr>
       <dgm:t>
         <a:bodyPr/>
         <a:lstStyle/>
@@ -2833,7 +2840,9 @@
       <dgm:prSet phldrT="[Text]" custT="1"/>
       <dgm:spPr>
         <a:solidFill>
-          <a:schemeClr val="accent3"/>
+          <a:schemeClr val="bg2">
+            <a:lumMod val="50000"/>
+          </a:schemeClr>
         </a:solidFill>
       </dgm:spPr>
       <dgm:t>
@@ -2842,7 +2851,11 @@
         <a:p>
           <a:r>
             <a:rPr lang="en-US" sz="1600" dirty="0"/>
-            <a:t>Configuration </a:t>
+            <a:t>Configuration</a:t>
+          </a:r>
+          <a:r>
+            <a:rPr lang="en-US" sz="2000" dirty="0"/>
+            <a:t> </a:t>
           </a:r>
         </a:p>
       </dgm:t>
@@ -2873,7 +2886,7 @@
       <dgm:prSet phldrT="[Text]"/>
       <dgm:spPr>
         <a:solidFill>
-          <a:schemeClr val="accent4"/>
+          <a:schemeClr val="tx2"/>
         </a:solidFill>
       </dgm:spPr>
       <dgm:t>
@@ -2916,7 +2929,11 @@
     </dgm:pt>
     <dgm:pt modelId="{BE28D08F-D798-48B7-8D61-9CB70080103E}">
       <dgm:prSet phldrT="[Text]"/>
-      <dgm:spPr/>
+      <dgm:spPr>
+        <a:solidFill>
+          <a:srgbClr val="007200"/>
+        </a:solidFill>
+      </dgm:spPr>
       <dgm:t>
         <a:bodyPr/>
         <a:lstStyle/>
@@ -3300,7 +3317,9 @@
           <a:avLst/>
         </a:prstGeom>
         <a:solidFill>
-          <a:schemeClr val="accent3"/>
+          <a:schemeClr val="bg2">
+            <a:lumMod val="50000"/>
+          </a:schemeClr>
         </a:solidFill>
         <a:ln w="12700" cap="flat" cmpd="sng" algn="ctr">
           <a:solidFill>
@@ -3454,7 +3473,7 @@
           <a:avLst/>
         </a:prstGeom>
         <a:solidFill>
-          <a:schemeClr val="accent4"/>
+          <a:schemeClr val="tx2"/>
         </a:solidFill>
         <a:ln w="12700" cap="flat" cmpd="sng" algn="ctr">
           <a:solidFill>
@@ -3603,12 +3622,7 @@
           <a:avLst/>
         </a:prstGeom>
         <a:solidFill>
-          <a:schemeClr val="accent1">
-            <a:hueOff val="0"/>
-            <a:satOff val="0"/>
-            <a:lumOff val="0"/>
-            <a:alphaOff val="0"/>
-          </a:schemeClr>
+          <a:srgbClr val="007200"/>
         </a:solidFill>
         <a:ln w="12700" cap="flat" cmpd="sng" algn="ctr">
           <a:solidFill>
@@ -3693,7 +3707,9 @@
           <a:avLst/>
         </a:prstGeom>
         <a:solidFill>
-          <a:schemeClr val="accent3"/>
+          <a:schemeClr val="bg2">
+            <a:lumMod val="50000"/>
+          </a:schemeClr>
         </a:solidFill>
         <a:ln w="12700" cap="flat" cmpd="sng" algn="ctr">
           <a:solidFill>
@@ -3743,7 +3759,11 @@
           </a:pPr>
           <a:r>
             <a:rPr lang="en-US" sz="1600" kern="1200" dirty="0"/>
-            <a:t>Configuration </a:t>
+            <a:t>Configuration</a:t>
+          </a:r>
+          <a:r>
+            <a:rPr lang="en-US" sz="2000" kern="1200" dirty="0"/>
+            <a:t> </a:t>
           </a:r>
         </a:p>
       </dsp:txBody>
@@ -3843,7 +3863,7 @@
           <a:avLst/>
         </a:prstGeom>
         <a:solidFill>
-          <a:schemeClr val="accent4"/>
+          <a:schemeClr val="tx2"/>
         </a:solidFill>
         <a:ln w="12700" cap="flat" cmpd="sng" algn="ctr">
           <a:solidFill>
@@ -3992,12 +4012,7 @@
           <a:avLst/>
         </a:prstGeom>
         <a:solidFill>
-          <a:schemeClr val="accent1">
-            <a:hueOff val="0"/>
-            <a:satOff val="0"/>
-            <a:lumOff val="0"/>
-            <a:alphaOff val="0"/>
-          </a:schemeClr>
+          <a:srgbClr val="007200"/>
         </a:solidFill>
         <a:ln w="12700" cap="flat" cmpd="sng" algn="ctr">
           <a:solidFill>
@@ -9673,6 +9688,90 @@
 </p:notes>
 </file>
 
+<file path=ppt/notesSlides/notesSlide17.xml><?xml version="1.0" encoding="utf-8"?>
+<p:notes xmlns:a="http://schemas.openxmlformats.org/drawingml/2006/main" xmlns:r="http://schemas.openxmlformats.org/officeDocument/2006/relationships" xmlns:p="http://schemas.openxmlformats.org/presentationml/2006/main">
+  <p:cSld>
+    <p:spTree>
+      <p:nvGrpSpPr>
+        <p:cNvPr id="1" name=""/>
+        <p:cNvGrpSpPr/>
+        <p:nvPr/>
+      </p:nvGrpSpPr>
+      <p:grpSpPr>
+        <a:xfrm>
+          <a:off x="0" y="0"/>
+          <a:ext cx="0" cy="0"/>
+          <a:chOff x="0" y="0"/>
+          <a:chExt cx="0" cy="0"/>
+        </a:xfrm>
+      </p:grpSpPr>
+      <p:sp>
+        <p:nvSpPr>
+          <p:cNvPr id="2" name="Slide Image Placeholder 1"/>
+          <p:cNvSpPr>
+            <a:spLocks noGrp="1" noRot="1" noChangeAspect="1"/>
+          </p:cNvSpPr>
+          <p:nvPr>
+            <p:ph type="sldImg"/>
+          </p:nvPr>
+        </p:nvSpPr>
+        <p:spPr/>
+      </p:sp>
+      <p:sp>
+        <p:nvSpPr>
+          <p:cNvPr id="3" name="Notes Placeholder 2"/>
+          <p:cNvSpPr>
+            <a:spLocks noGrp="1"/>
+          </p:cNvSpPr>
+          <p:nvPr>
+            <p:ph type="body" idx="1"/>
+          </p:nvPr>
+        </p:nvSpPr>
+        <p:spPr/>
+        <p:txBody>
+          <a:bodyPr/>
+          <a:lstStyle/>
+          <a:p>
+            <a:endParaRPr lang="en-US" dirty="0"/>
+          </a:p>
+        </p:txBody>
+      </p:sp>
+      <p:sp>
+        <p:nvSpPr>
+          <p:cNvPr id="4" name="Slide Number Placeholder 3"/>
+          <p:cNvSpPr>
+            <a:spLocks noGrp="1"/>
+          </p:cNvSpPr>
+          <p:nvPr>
+            <p:ph type="sldNum" sz="quarter" idx="10"/>
+          </p:nvPr>
+        </p:nvSpPr>
+        <p:spPr/>
+        <p:txBody>
+          <a:bodyPr/>
+          <a:lstStyle/>
+          <a:p>
+            <a:fld id="{E78E71CD-9786-4621-AA97-B53C62C3E534}" type="slidenum">
+              <a:rPr lang="en-US" smtClean="0"/>
+              <a:t>28</a:t>
+            </a:fld>
+            <a:endParaRPr lang="en-US"/>
+          </a:p>
+        </p:txBody>
+      </p:sp>
+    </p:spTree>
+    <p:extLst>
+      <p:ext uri="{BB962C8B-B14F-4D97-AF65-F5344CB8AC3E}">
+        <p14:creationId xmlns:p14="http://schemas.microsoft.com/office/powerpoint/2010/main" val="2100401630"/>
+      </p:ext>
+    </p:extLst>
+  </p:cSld>
+  <p:clrMapOvr>
+    <a:masterClrMapping/>
+  </p:clrMapOvr>
+</p:notes>
+</file>
+
 <file path=ppt/notesSlides/notesSlide2.xml><?xml version="1.0" encoding="utf-8"?>
 <p:notes xmlns:a="http://schemas.openxmlformats.org/drawingml/2006/main" xmlns:r="http://schemas.openxmlformats.org/officeDocument/2006/relationships" xmlns:p="http://schemas.openxmlformats.org/presentationml/2006/main">
   <p:cSld>
@@ -17923,27 +18022,6 @@
           </a:p>
         </p:txBody>
       </p:sp>
-      <p:graphicFrame>
-        <p:nvGraphicFramePr>
-          <p:cNvPr id="5" name="Content Placeholder 4"/>
-          <p:cNvGraphicFramePr>
-            <a:graphicFrameLocks noGrp="1"/>
-          </p:cNvGraphicFramePr>
-          <p:nvPr>
-            <p:ph sz="half" idx="1"/>
-            <p:extLst/>
-          </p:nvPr>
-        </p:nvGraphicFramePr>
-        <p:xfrm>
-          <a:off x="604838" y="974725"/>
-          <a:ext cx="5389562" cy="5202238"/>
-        </p:xfrm>
-        <a:graphic>
-          <a:graphicData uri="http://schemas.openxmlformats.org/drawingml/2006/diagram">
-            <dgm:relIds xmlns:dgm="http://schemas.openxmlformats.org/drawingml/2006/diagram" xmlns:r="http://schemas.openxmlformats.org/officeDocument/2006/relationships" r:dm="rId3" r:lo="rId4" r:qs="rId5" r:cs="rId6"/>
-          </a:graphicData>
-        </a:graphic>
-      </p:graphicFrame>
       <p:sp>
         <p:nvSpPr>
           <p:cNvPr id="3" name="Content Placeholder 2">
@@ -18345,6 +18423,61 @@
           </a:p>
         </p:txBody>
       </p:sp>
+      <p:sp>
+        <p:nvSpPr>
+          <p:cNvPr id="4" name="Content Placeholder 3">
+            <a:extLst>
+              <a:ext uri="{FF2B5EF4-FFF2-40B4-BE49-F238E27FC236}">
+                <a16:creationId xmlns:a16="http://schemas.microsoft.com/office/drawing/2014/main" id="{EF996D94-ECFB-41D9-A5F5-9631E809FAC7}"/>
+              </a:ext>
+            </a:extLst>
+          </p:cNvPr>
+          <p:cNvSpPr>
+            <a:spLocks noGrp="1"/>
+          </p:cNvSpPr>
+          <p:nvPr>
+            <p:ph sz="half" idx="1"/>
+          </p:nvPr>
+        </p:nvSpPr>
+        <p:spPr/>
+        <p:txBody>
+          <a:bodyPr/>
+          <a:lstStyle/>
+          <a:p>
+            <a:endParaRPr lang="en-US"/>
+          </a:p>
+        </p:txBody>
+      </p:sp>
+      <p:graphicFrame>
+        <p:nvGraphicFramePr>
+          <p:cNvPr id="11" name="Content Placeholder 4">
+            <a:extLst>
+              <a:ext uri="{FF2B5EF4-FFF2-40B4-BE49-F238E27FC236}">
+                <a16:creationId xmlns:a16="http://schemas.microsoft.com/office/drawing/2014/main" id="{CD9F4A9E-CD00-499F-BDF9-94CBA0E2D8B3}"/>
+              </a:ext>
+            </a:extLst>
+          </p:cNvPr>
+          <p:cNvGraphicFramePr>
+            <a:graphicFrameLocks/>
+          </p:cNvGraphicFramePr>
+          <p:nvPr>
+            <p:extLst>
+              <p:ext uri="{D42A27DB-BD31-4B8C-83A1-F6EECF244321}">
+                <p14:modId xmlns:p14="http://schemas.microsoft.com/office/powerpoint/2010/main" val="1376058075"/>
+              </p:ext>
+            </p:extLst>
+          </p:nvPr>
+        </p:nvGraphicFramePr>
+        <p:xfrm>
+          <a:off x="604838" y="974725"/>
+          <a:ext cx="5389562" cy="5202238"/>
+        </p:xfrm>
+        <a:graphic>
+          <a:graphicData uri="http://schemas.openxmlformats.org/drawingml/2006/diagram">
+            <dgm:relIds xmlns:dgm="http://schemas.openxmlformats.org/drawingml/2006/diagram" xmlns:r="http://schemas.openxmlformats.org/officeDocument/2006/relationships" r:dm="rId3" r:lo="rId4" r:qs="rId5" r:cs="rId6"/>
+          </a:graphicData>
+        </a:graphic>
+      </p:graphicFrame>
     </p:spTree>
     <p:extLst>
       <p:ext uri="{BB962C8B-B14F-4D97-AF65-F5344CB8AC3E}">
@@ -18399,27 +18532,6 @@
           </a:p>
         </p:txBody>
       </p:sp>
-      <p:graphicFrame>
-        <p:nvGraphicFramePr>
-          <p:cNvPr id="5" name="Content Placeholder 4"/>
-          <p:cNvGraphicFramePr>
-            <a:graphicFrameLocks noGrp="1"/>
-          </p:cNvGraphicFramePr>
-          <p:nvPr>
-            <p:ph sz="half" idx="1"/>
-            <p:extLst/>
-          </p:nvPr>
-        </p:nvGraphicFramePr>
-        <p:xfrm>
-          <a:off x="604838" y="974725"/>
-          <a:ext cx="5389562" cy="5202238"/>
-        </p:xfrm>
-        <a:graphic>
-          <a:graphicData uri="http://schemas.openxmlformats.org/drawingml/2006/diagram">
-            <dgm:relIds xmlns:dgm="http://schemas.openxmlformats.org/drawingml/2006/diagram" xmlns:r="http://schemas.openxmlformats.org/officeDocument/2006/relationships" r:dm="rId3" r:lo="rId4" r:qs="rId5" r:cs="rId6"/>
-          </a:graphicData>
-        </a:graphic>
-      </p:graphicFrame>
       <p:sp>
         <p:nvSpPr>
           <p:cNvPr id="3" name="Content Placeholder 2">
@@ -18801,6 +18913,61 @@
           </a:p>
         </p:txBody>
       </p:sp>
+      <p:sp>
+        <p:nvSpPr>
+          <p:cNvPr id="4" name="Content Placeholder 3">
+            <a:extLst>
+              <a:ext uri="{FF2B5EF4-FFF2-40B4-BE49-F238E27FC236}">
+                <a16:creationId xmlns:a16="http://schemas.microsoft.com/office/drawing/2014/main" id="{2F8B6176-1F7B-40B9-8FE5-6046CC17437D}"/>
+              </a:ext>
+            </a:extLst>
+          </p:cNvPr>
+          <p:cNvSpPr>
+            <a:spLocks noGrp="1"/>
+          </p:cNvSpPr>
+          <p:nvPr>
+            <p:ph sz="half" idx="1"/>
+          </p:nvPr>
+        </p:nvSpPr>
+        <p:spPr/>
+        <p:txBody>
+          <a:bodyPr/>
+          <a:lstStyle/>
+          <a:p>
+            <a:endParaRPr lang="en-US"/>
+          </a:p>
+        </p:txBody>
+      </p:sp>
+      <p:graphicFrame>
+        <p:nvGraphicFramePr>
+          <p:cNvPr id="11" name="Content Placeholder 4">
+            <a:extLst>
+              <a:ext uri="{FF2B5EF4-FFF2-40B4-BE49-F238E27FC236}">
+                <a16:creationId xmlns:a16="http://schemas.microsoft.com/office/drawing/2014/main" id="{F43FD539-55E5-456B-81B3-5A296608A610}"/>
+              </a:ext>
+            </a:extLst>
+          </p:cNvPr>
+          <p:cNvGraphicFramePr>
+            <a:graphicFrameLocks/>
+          </p:cNvGraphicFramePr>
+          <p:nvPr>
+            <p:extLst>
+              <p:ext uri="{D42A27DB-BD31-4B8C-83A1-F6EECF244321}">
+                <p14:modId xmlns:p14="http://schemas.microsoft.com/office/powerpoint/2010/main" val="1376058075"/>
+              </p:ext>
+            </p:extLst>
+          </p:nvPr>
+        </p:nvGraphicFramePr>
+        <p:xfrm>
+          <a:off x="604838" y="974725"/>
+          <a:ext cx="5389562" cy="5202238"/>
+        </p:xfrm>
+        <a:graphic>
+          <a:graphicData uri="http://schemas.openxmlformats.org/drawingml/2006/diagram">
+            <dgm:relIds xmlns:dgm="http://schemas.openxmlformats.org/drawingml/2006/diagram" xmlns:r="http://schemas.openxmlformats.org/officeDocument/2006/relationships" r:dm="rId3" r:lo="rId4" r:qs="rId5" r:cs="rId6"/>
+          </a:graphicData>
+        </a:graphic>
+      </p:graphicFrame>
     </p:spTree>
     <p:extLst>
       <p:ext uri="{BB962C8B-B14F-4D97-AF65-F5344CB8AC3E}">
@@ -20288,7 +20455,7 @@
             <a:avLst/>
           </a:prstGeom>
           <a:solidFill>
-            <a:schemeClr val="accent3"/>
+            <a:srgbClr val="C00000"/>
           </a:solidFill>
           <a:ln w="28575">
             <a:solidFill>
@@ -20344,7 +20511,7 @@
             <a:avLst/>
           </a:prstGeom>
           <a:solidFill>
-            <a:schemeClr val="accent3"/>
+            <a:srgbClr val="C00000"/>
           </a:solidFill>
           <a:ln w="28575">
             <a:solidFill>
@@ -20400,7 +20567,7 @@
             <a:avLst/>
           </a:prstGeom>
           <a:solidFill>
-            <a:schemeClr val="accent2"/>
+            <a:srgbClr val="C00000"/>
           </a:solidFill>
           <a:ln w="28575">
             <a:solidFill>
@@ -20456,7 +20623,7 @@
             <a:avLst/>
           </a:prstGeom>
           <a:solidFill>
-            <a:schemeClr val="accent2"/>
+            <a:srgbClr val="C00000"/>
           </a:solidFill>
           <a:ln w="28575">
             <a:solidFill>
@@ -20512,7 +20679,7 @@
             <a:avLst/>
           </a:prstGeom>
           <a:solidFill>
-            <a:schemeClr val="accent1"/>
+            <a:srgbClr val="C00000"/>
           </a:solidFill>
           <a:ln w="28575">
             <a:solidFill>
@@ -20568,7 +20735,7 @@
             <a:avLst/>
           </a:prstGeom>
           <a:solidFill>
-            <a:schemeClr val="accent1"/>
+            <a:srgbClr val="C00000"/>
           </a:solidFill>
           <a:ln w="28575">
             <a:solidFill>
@@ -20646,7 +20813,7 @@
             <a:avLst/>
           </a:prstGeom>
           <a:solidFill>
-            <a:schemeClr val="accent1"/>
+            <a:srgbClr val="C00000"/>
           </a:solidFill>
           <a:ln w="28575">
             <a:solidFill>
@@ -20702,7 +20869,7 @@
             <a:avLst/>
           </a:prstGeom>
           <a:solidFill>
-            <a:schemeClr val="accent2"/>
+            <a:srgbClr val="C00000"/>
           </a:solidFill>
           <a:ln w="28575">
             <a:solidFill>
@@ -20758,7 +20925,7 @@
             <a:avLst/>
           </a:prstGeom>
           <a:solidFill>
-            <a:schemeClr val="accent3"/>
+            <a:srgbClr val="C00000"/>
           </a:solidFill>
           <a:ln w="28575">
             <a:solidFill>
@@ -26916,6 +27083,64 @@
       </p:grpSpPr>
       <p:sp>
         <p:nvSpPr>
+          <p:cNvPr id="3" name="Text Placeholder 2">
+            <a:extLst>
+              <a:ext uri="{FF2B5EF4-FFF2-40B4-BE49-F238E27FC236}">
+                <a16:creationId xmlns:a16="http://schemas.microsoft.com/office/drawing/2014/main" id="{919CF29D-C3A2-495A-B8A5-779AABA82D2D}"/>
+              </a:ext>
+            </a:extLst>
+          </p:cNvPr>
+          <p:cNvSpPr>
+            <a:spLocks noGrp="1"/>
+          </p:cNvSpPr>
+          <p:nvPr>
+            <p:ph type="body" sz="quarter" idx="10"/>
+          </p:nvPr>
+        </p:nvSpPr>
+        <p:spPr/>
+        <p:txBody>
+          <a:bodyPr/>
+          <a:lstStyle/>
+          <a:p>
+            <a:r>
+              <a:rPr lang="en-US" dirty="0"/>
+              <a:t>Resources</a:t>
+            </a:r>
+          </a:p>
+        </p:txBody>
+      </p:sp>
+    </p:spTree>
+    <p:extLst>
+      <p:ext uri="{BB962C8B-B14F-4D97-AF65-F5344CB8AC3E}">
+        <p14:creationId xmlns:p14="http://schemas.microsoft.com/office/powerpoint/2010/main" val="732455271"/>
+      </p:ext>
+    </p:extLst>
+  </p:cSld>
+  <p:clrMapOvr>
+    <a:masterClrMapping/>
+  </p:clrMapOvr>
+</p:sld>
+</file>
+
+<file path=ppt/slides/slide29.xml><?xml version="1.0" encoding="utf-8"?>
+<p:sld xmlns:a="http://schemas.openxmlformats.org/drawingml/2006/main" xmlns:r="http://schemas.openxmlformats.org/officeDocument/2006/relationships" xmlns:p="http://schemas.openxmlformats.org/presentationml/2006/main">
+  <p:cSld>
+    <p:spTree>
+      <p:nvGrpSpPr>
+        <p:cNvPr id="1" name=""/>
+        <p:cNvGrpSpPr/>
+        <p:nvPr/>
+      </p:nvGrpSpPr>
+      <p:grpSpPr>
+        <a:xfrm>
+          <a:off x="0" y="0"/>
+          <a:ext cx="0" cy="0"/>
+          <a:chOff x="0" y="0"/>
+          <a:chExt cx="0" cy="0"/>
+        </a:xfrm>
+      </p:grpSpPr>
+      <p:sp>
+        <p:nvSpPr>
           <p:cNvPr id="2" name="Title 1"/>
           <p:cNvSpPr>
             <a:spLocks noGrp="1"/>
@@ -26992,31 +27217,6 @@
           </a:p>
           <a:p>
             <a:endParaRPr lang="en-US" dirty="0"/>
-          </a:p>
-        </p:txBody>
-      </p:sp>
-      <p:sp>
-        <p:nvSpPr>
-          <p:cNvPr id="4" name="Content Placeholder 3">
-            <a:extLst>
-              <a:ext uri="{FF2B5EF4-FFF2-40B4-BE49-F238E27FC236}">
-                <a16:creationId xmlns:a16="http://schemas.microsoft.com/office/drawing/2014/main" id="{4207B427-E16C-4EEB-B108-32D01D640E35}"/>
-              </a:ext>
-            </a:extLst>
-          </p:cNvPr>
-          <p:cNvSpPr>
-            <a:spLocks noGrp="1"/>
-          </p:cNvSpPr>
-          <p:nvPr>
-            <p:ph sz="half" idx="2"/>
-          </p:nvPr>
-        </p:nvSpPr>
-        <p:spPr/>
-        <p:txBody>
-          <a:bodyPr/>
-          <a:lstStyle/>
-          <a:p>
-            <a:endParaRPr lang="en-US"/>
           </a:p>
         </p:txBody>
       </p:sp>
@@ -29645,9 +29845,7 @@
             <a:avLst/>
           </a:prstGeom>
           <a:solidFill>
-            <a:schemeClr val="accent1">
-              <a:lumMod val="75000"/>
-            </a:schemeClr>
+            <a:srgbClr val="08487A"/>
           </a:solidFill>
           <a:ln w="28575">
             <a:solidFill>
@@ -29758,7 +29956,7 @@
         </p:nvSpPr>
         <p:spPr>
           <a:xfrm>
-            <a:off x="138742" y="3166900"/>
+            <a:off x="317841" y="3166900"/>
             <a:ext cx="1836344" cy="745436"/>
           </a:xfrm>
           <a:prstGeom prst="roundRect">
@@ -29822,7 +30020,7 @@
         </p:nvSpPr>
         <p:spPr>
           <a:xfrm>
-            <a:off x="114954" y="4422371"/>
+            <a:off x="294053" y="4422371"/>
             <a:ext cx="1840338" cy="771788"/>
           </a:xfrm>
           <a:prstGeom prst="roundRect">

</xml_diff>

<commit_message>
Bringing changes from the Training to the Defaults
Cleaned up the templates, changed some of the graphs to match up with the content on the DCAF Training.
</commit_message>
<xml_diff>
--- a/Trunk/Getting Started Material/DCAF Training/1 Introduction to DCAF.pptx
+++ b/Trunk/Getting Started Material/DCAF Training/1 Introduction to DCAF.pptx
@@ -8377,7 +8377,7 @@
           <a:p>
             <a:fld id="{A8975C80-FF7F-4140-B105-CF3FA3859277}" type="datetimeFigureOut">
               <a:rPr lang="en-US" smtClean="0"/>
-              <a:t>2018-06-27</a:t>
+              <a:t>2018-06-28</a:t>
             </a:fld>
             <a:endParaRPr lang="en-US"/>
           </a:p>
@@ -13706,7 +13706,7 @@
           <a:p>
             <a:fld id="{1EAA415B-8007-489A-BDE4-6C1DCF92BB48}" type="datetimeFigureOut">
               <a:rPr lang="en-US" smtClean="0"/>
-              <a:t>2018-06-27</a:t>
+              <a:t>2018-06-28</a:t>
             </a:fld>
             <a:endParaRPr lang="en-US"/>
           </a:p>
@@ -14697,7 +14697,7 @@
           <a:p>
             <a:fld id="{1EAA415B-8007-489A-BDE4-6C1DCF92BB48}" type="datetimeFigureOut">
               <a:rPr lang="en-US" smtClean="0"/>
-              <a:t>2018-06-27</a:t>
+              <a:t>2018-06-28</a:t>
             </a:fld>
             <a:endParaRPr lang="en-US"/>
           </a:p>
@@ -29788,7 +29788,7 @@
           </a:prstGeom>
           <a:solidFill>
             <a:schemeClr val="accent3">
-              <a:lumMod val="75000"/>
+              <a:lumMod val="50000"/>
             </a:schemeClr>
           </a:solidFill>
           <a:ln w="28575">

</xml_diff>